<commit_message>
Update Recursion and Recurrence Relation.pptx
</commit_message>
<xml_diff>
--- a/Week 8 and 9 - Recursion and Recurrence relations/Recursion and Recurrence Relation.pptx
+++ b/Week 8 and 9 - Recursion and Recurrence relations/Recursion and Recurrence Relation.pptx
@@ -1858,7 +1858,7 @@
           <a:p>
             <a:fld id="{F666E1FD-E7A0-497B-BBC0-740BAAC97C64}" type="datetimeFigureOut">
               <a:rPr lang="en-PH" smtClean="0"/>
-              <a:t>5/22/24</a:t>
+              <a:t>5/23/24</a:t>
             </a:fld>
             <a:endParaRPr lang="en-PH"/>
           </a:p>
@@ -4375,7 +4375,7 @@
           <a:p>
             <a:fld id="{0CCF0B81-6BD8-4C65-9459-815598C5F1F4}" type="datetimeFigureOut">
               <a:rPr lang="en-PH" smtClean="0"/>
-              <a:t>5/22/24</a:t>
+              <a:t>5/23/24</a:t>
             </a:fld>
             <a:endParaRPr lang="en-PH"/>
           </a:p>
@@ -4575,7 +4575,7 @@
           <a:p>
             <a:fld id="{0CCF0B81-6BD8-4C65-9459-815598C5F1F4}" type="datetimeFigureOut">
               <a:rPr lang="en-PH" smtClean="0"/>
-              <a:t>5/22/24</a:t>
+              <a:t>5/23/24</a:t>
             </a:fld>
             <a:endParaRPr lang="en-PH"/>
           </a:p>
@@ -4785,7 +4785,7 @@
           <a:p>
             <a:fld id="{0CCF0B81-6BD8-4C65-9459-815598C5F1F4}" type="datetimeFigureOut">
               <a:rPr lang="en-PH" smtClean="0"/>
-              <a:t>5/22/24</a:t>
+              <a:t>5/23/24</a:t>
             </a:fld>
             <a:endParaRPr lang="en-PH"/>
           </a:p>
@@ -4985,7 +4985,7 @@
           <a:p>
             <a:fld id="{0CCF0B81-6BD8-4C65-9459-815598C5F1F4}" type="datetimeFigureOut">
               <a:rPr lang="en-PH" smtClean="0"/>
-              <a:t>5/22/24</a:t>
+              <a:t>5/23/24</a:t>
             </a:fld>
             <a:endParaRPr lang="en-PH"/>
           </a:p>
@@ -5261,7 +5261,7 @@
           <a:p>
             <a:fld id="{0CCF0B81-6BD8-4C65-9459-815598C5F1F4}" type="datetimeFigureOut">
               <a:rPr lang="en-PH" smtClean="0"/>
-              <a:t>5/22/24</a:t>
+              <a:t>5/23/24</a:t>
             </a:fld>
             <a:endParaRPr lang="en-PH"/>
           </a:p>
@@ -5529,7 +5529,7 @@
           <a:p>
             <a:fld id="{0CCF0B81-6BD8-4C65-9459-815598C5F1F4}" type="datetimeFigureOut">
               <a:rPr lang="en-PH" smtClean="0"/>
-              <a:t>5/22/24</a:t>
+              <a:t>5/23/24</a:t>
             </a:fld>
             <a:endParaRPr lang="en-PH"/>
           </a:p>
@@ -5944,7 +5944,7 @@
           <a:p>
             <a:fld id="{0CCF0B81-6BD8-4C65-9459-815598C5F1F4}" type="datetimeFigureOut">
               <a:rPr lang="en-PH" smtClean="0"/>
-              <a:t>5/22/24</a:t>
+              <a:t>5/23/24</a:t>
             </a:fld>
             <a:endParaRPr lang="en-PH"/>
           </a:p>
@@ -6086,7 +6086,7 @@
           <a:p>
             <a:fld id="{0CCF0B81-6BD8-4C65-9459-815598C5F1F4}" type="datetimeFigureOut">
               <a:rPr lang="en-PH" smtClean="0"/>
-              <a:t>5/22/24</a:t>
+              <a:t>5/23/24</a:t>
             </a:fld>
             <a:endParaRPr lang="en-PH"/>
           </a:p>
@@ -6199,7 +6199,7 @@
           <a:p>
             <a:fld id="{0CCF0B81-6BD8-4C65-9459-815598C5F1F4}" type="datetimeFigureOut">
               <a:rPr lang="en-PH" smtClean="0"/>
-              <a:t>5/22/24</a:t>
+              <a:t>5/23/24</a:t>
             </a:fld>
             <a:endParaRPr lang="en-PH"/>
           </a:p>
@@ -6512,7 +6512,7 @@
           <a:p>
             <a:fld id="{0CCF0B81-6BD8-4C65-9459-815598C5F1F4}" type="datetimeFigureOut">
               <a:rPr lang="en-PH" smtClean="0"/>
-              <a:t>5/22/24</a:t>
+              <a:t>5/23/24</a:t>
             </a:fld>
             <a:endParaRPr lang="en-PH"/>
           </a:p>
@@ -6801,7 +6801,7 @@
           <a:p>
             <a:fld id="{0CCF0B81-6BD8-4C65-9459-815598C5F1F4}" type="datetimeFigureOut">
               <a:rPr lang="en-PH" smtClean="0"/>
-              <a:t>5/22/24</a:t>
+              <a:t>5/23/24</a:t>
             </a:fld>
             <a:endParaRPr lang="en-PH"/>
           </a:p>
@@ -7044,7 +7044,7 @@
           <a:p>
             <a:fld id="{0CCF0B81-6BD8-4C65-9459-815598C5F1F4}" type="datetimeFigureOut">
               <a:rPr lang="en-PH" smtClean="0"/>
-              <a:t>5/22/24</a:t>
+              <a:t>5/23/24</a:t>
             </a:fld>
             <a:endParaRPr lang="en-PH"/>
           </a:p>
@@ -7993,8 +7993,8 @@
           </a:p>
         </p:txBody>
       </p:sp>
-      <mc:AlternateContent xmlns:mc="http://schemas.openxmlformats.org/markup-compatibility/2006">
-        <mc:Choice xmlns:a14="http://schemas.microsoft.com/office/drawing/2010/main" Requires="a14">
+      <mc:AlternateContent xmlns:mc="http://schemas.openxmlformats.org/markup-compatibility/2006" xmlns:a14="http://schemas.microsoft.com/office/drawing/2010/main">
+        <mc:Choice Requires="a14">
           <p:sp>
             <p:nvSpPr>
               <p:cNvPr id="5" name="TextBox 4">
@@ -8302,7 +8302,7 @@
             </p:txBody>
           </p:sp>
         </mc:Choice>
-        <mc:Fallback>
+        <mc:Fallback xmlns="">
           <p:sp>
             <p:nvSpPr>
               <p:cNvPr id="5" name="TextBox 4">
@@ -8428,8 +8428,8 @@
           </a:prstGeom>
         </p:spPr>
       </p:pic>
-      <mc:AlternateContent xmlns:mc="http://schemas.openxmlformats.org/markup-compatibility/2006">
-        <mc:Choice xmlns:a14="http://schemas.microsoft.com/office/drawing/2010/main" Requires="a14">
+      <mc:AlternateContent xmlns:mc="http://schemas.openxmlformats.org/markup-compatibility/2006" xmlns:a14="http://schemas.microsoft.com/office/drawing/2010/main">
+        <mc:Choice Requires="a14">
           <p:sp>
             <p:nvSpPr>
               <p:cNvPr id="24" name="TextBox 23">
@@ -8513,7 +8513,7 @@
             </p:txBody>
           </p:sp>
         </mc:Choice>
-        <mc:Fallback>
+        <mc:Fallback xmlns="">
           <p:sp>
             <p:nvSpPr>
               <p:cNvPr id="24" name="TextBox 23">
@@ -8561,8 +8561,8 @@
           </p:sp>
         </mc:Fallback>
       </mc:AlternateContent>
-      <mc:AlternateContent xmlns:mc="http://schemas.openxmlformats.org/markup-compatibility/2006">
-        <mc:Choice xmlns:a14="http://schemas.microsoft.com/office/drawing/2010/main" Requires="a14">
+      <mc:AlternateContent xmlns:mc="http://schemas.openxmlformats.org/markup-compatibility/2006" xmlns:a14="http://schemas.microsoft.com/office/drawing/2010/main">
+        <mc:Choice Requires="a14">
           <p:sp>
             <p:nvSpPr>
               <p:cNvPr id="27" name="TextBox 26">
@@ -8628,7 +8628,7 @@
             </p:txBody>
           </p:sp>
         </mc:Choice>
-        <mc:Fallback>
+        <mc:Fallback xmlns="">
           <p:sp>
             <p:nvSpPr>
               <p:cNvPr id="27" name="TextBox 26">
@@ -9063,8 +9063,8 @@
           </a:fontRef>
         </p:style>
       </p:cxnSp>
-      <mc:AlternateContent xmlns:mc="http://schemas.openxmlformats.org/markup-compatibility/2006">
-        <mc:Choice xmlns:a14="http://schemas.microsoft.com/office/drawing/2010/main" Requires="a14">
+      <mc:AlternateContent xmlns:mc="http://schemas.openxmlformats.org/markup-compatibility/2006" xmlns:a14="http://schemas.microsoft.com/office/drawing/2010/main">
+        <mc:Choice Requires="a14">
           <p:sp>
             <p:nvSpPr>
               <p:cNvPr id="22" name="TextBox 21">
@@ -9192,7 +9192,7 @@
             </p:txBody>
           </p:sp>
         </mc:Choice>
-        <mc:Fallback>
+        <mc:Fallback xmlns="">
           <p:sp>
             <p:nvSpPr>
               <p:cNvPr id="22" name="TextBox 21">
@@ -12376,8 +12376,8 @@
           </p:sp>
         </mc:Fallback>
       </mc:AlternateContent>
-      <mc:AlternateContent xmlns:mc="http://schemas.openxmlformats.org/markup-compatibility/2006">
-        <mc:Choice xmlns:a14="http://schemas.microsoft.com/office/drawing/2010/main" Requires="a14">
+      <mc:AlternateContent xmlns:mc="http://schemas.openxmlformats.org/markup-compatibility/2006" xmlns:a14="http://schemas.microsoft.com/office/drawing/2010/main">
+        <mc:Choice Requires="a14">
           <p:sp>
             <p:nvSpPr>
               <p:cNvPr id="7" name="TextBox 6">
@@ -12540,7 +12540,7 @@
             </p:txBody>
           </p:sp>
         </mc:Choice>
-        <mc:Fallback>
+        <mc:Fallback xmlns="">
           <p:sp>
             <p:nvSpPr>
               <p:cNvPr id="7" name="TextBox 6">
@@ -12930,8 +12930,8 @@
           </p:sp>
         </mc:Fallback>
       </mc:AlternateContent>
-      <mc:AlternateContent xmlns:mc="http://schemas.openxmlformats.org/markup-compatibility/2006">
-        <mc:Choice xmlns:a14="http://schemas.microsoft.com/office/drawing/2010/main" Requires="a14">
+      <mc:AlternateContent xmlns:mc="http://schemas.openxmlformats.org/markup-compatibility/2006" xmlns:a14="http://schemas.microsoft.com/office/drawing/2010/main">
+        <mc:Choice Requires="a14">
           <p:sp>
             <p:nvSpPr>
               <p:cNvPr id="14" name="TextBox 13">
@@ -13086,7 +13086,7 @@
             </p:txBody>
           </p:sp>
         </mc:Choice>
-        <mc:Fallback>
+        <mc:Fallback xmlns="">
           <p:sp>
             <p:nvSpPr>
               <p:cNvPr id="14" name="TextBox 13">
@@ -13136,8 +13136,8 @@
           </p:sp>
         </mc:Fallback>
       </mc:AlternateContent>
-      <mc:AlternateContent xmlns:mc="http://schemas.openxmlformats.org/markup-compatibility/2006">
-        <mc:Choice xmlns:a14="http://schemas.microsoft.com/office/drawing/2010/main" Requires="a14">
+      <mc:AlternateContent xmlns:mc="http://schemas.openxmlformats.org/markup-compatibility/2006" xmlns:a14="http://schemas.microsoft.com/office/drawing/2010/main">
+        <mc:Choice Requires="a14">
           <p:sp>
             <p:nvSpPr>
               <p:cNvPr id="15" name="TextBox 14">
@@ -13271,7 +13271,7 @@
             </p:txBody>
           </p:sp>
         </mc:Choice>
-        <mc:Fallback>
+        <mc:Fallback xmlns="">
           <p:sp>
             <p:nvSpPr>
               <p:cNvPr id="15" name="TextBox 14">
@@ -13317,8 +13317,8 @@
           </p:sp>
         </mc:Fallback>
       </mc:AlternateContent>
-      <mc:AlternateContent xmlns:mc="http://schemas.openxmlformats.org/markup-compatibility/2006">
-        <mc:Choice xmlns:a14="http://schemas.microsoft.com/office/drawing/2010/main" Requires="a14">
+      <mc:AlternateContent xmlns:mc="http://schemas.openxmlformats.org/markup-compatibility/2006" xmlns:a14="http://schemas.microsoft.com/office/drawing/2010/main">
+        <mc:Choice Requires="a14">
           <p:sp>
             <p:nvSpPr>
               <p:cNvPr id="16" name="TextBox 15">
@@ -13367,7 +13367,7 @@
             </p:txBody>
           </p:sp>
         </mc:Choice>
-        <mc:Fallback>
+        <mc:Fallback xmlns="">
           <p:sp>
             <p:nvSpPr>
               <p:cNvPr id="16" name="TextBox 15">
@@ -13587,8 +13587,8 @@
           </p:sp>
         </mc:Fallback>
       </mc:AlternateContent>
-      <mc:AlternateContent xmlns:mc="http://schemas.openxmlformats.org/markup-compatibility/2006">
-        <mc:Choice xmlns:a14="http://schemas.microsoft.com/office/drawing/2010/main" Requires="a14">
+      <mc:AlternateContent xmlns:mc="http://schemas.openxmlformats.org/markup-compatibility/2006" xmlns:a14="http://schemas.microsoft.com/office/drawing/2010/main">
+        <mc:Choice Requires="a14">
           <p:sp>
             <p:nvSpPr>
               <p:cNvPr id="13" name="TextBox 12">
@@ -13714,7 +13714,7 @@
             </p:txBody>
           </p:sp>
         </mc:Choice>
-        <mc:Fallback>
+        <mc:Fallback xmlns="">
           <p:sp>
             <p:nvSpPr>
               <p:cNvPr id="13" name="TextBox 12">
@@ -13759,8 +13759,8 @@
           </p:sp>
         </mc:Fallback>
       </mc:AlternateContent>
-      <mc:AlternateContent xmlns:mc="http://schemas.openxmlformats.org/markup-compatibility/2006">
-        <mc:Choice xmlns:a14="http://schemas.microsoft.com/office/drawing/2010/main" Requires="a14">
+      <mc:AlternateContent xmlns:mc="http://schemas.openxmlformats.org/markup-compatibility/2006" xmlns:a14="http://schemas.microsoft.com/office/drawing/2010/main">
+        <mc:Choice Requires="a14">
           <p:sp>
             <p:nvSpPr>
               <p:cNvPr id="17" name="TextBox 16">
@@ -13886,7 +13886,7 @@
             </p:txBody>
           </p:sp>
         </mc:Choice>
-        <mc:Fallback>
+        <mc:Fallback xmlns="">
           <p:sp>
             <p:nvSpPr>
               <p:cNvPr id="17" name="TextBox 16">
@@ -13936,8 +13936,8 @@
           </p:sp>
         </mc:Fallback>
       </mc:AlternateContent>
-      <mc:AlternateContent xmlns:mc="http://schemas.openxmlformats.org/markup-compatibility/2006">
-        <mc:Choice xmlns:a14="http://schemas.microsoft.com/office/drawing/2010/main" Requires="a14">
+      <mc:AlternateContent xmlns:mc="http://schemas.openxmlformats.org/markup-compatibility/2006" xmlns:a14="http://schemas.microsoft.com/office/drawing/2010/main">
+        <mc:Choice Requires="a14">
           <p:sp>
             <p:nvSpPr>
               <p:cNvPr id="26" name="TextBox 25">
@@ -14010,7 +14010,7 @@
             </p:txBody>
           </p:sp>
         </mc:Choice>
-        <mc:Fallback>
+        <mc:Fallback xmlns="">
           <p:sp>
             <p:nvSpPr>
               <p:cNvPr id="26" name="TextBox 25">
@@ -14280,8 +14280,8 @@
           </mc:Fallback>
         </mc:AlternateContent>
       </p:grpSp>
-      <mc:AlternateContent xmlns:mc="http://schemas.openxmlformats.org/markup-compatibility/2006">
-        <mc:Choice xmlns:p14="http://schemas.microsoft.com/office/powerpoint/2010/main" Requires="p14">
+      <mc:AlternateContent xmlns:mc="http://schemas.openxmlformats.org/markup-compatibility/2006" xmlns:p14="http://schemas.microsoft.com/office/powerpoint/2010/main">
+        <mc:Choice Requires="p14">
           <p:contentPart p14:bwMode="auto" r:id="rId24">
             <p14:nvContentPartPr>
               <p14:cNvPr id="38" name="Ink 37">
@@ -14300,7 +14300,7 @@
             </p14:xfrm>
           </p:contentPart>
         </mc:Choice>
-        <mc:Fallback>
+        <mc:Fallback xmlns="">
           <p:pic>
             <p:nvPicPr>
               <p:cNvPr id="38" name="Ink 37">
@@ -14396,8 +14396,8 @@
             <a:chExt cx="3906720" cy="425520"/>
           </a:xfrm>
         </p:grpSpPr>
-        <mc:AlternateContent xmlns:mc="http://schemas.openxmlformats.org/markup-compatibility/2006">
-          <mc:Choice xmlns:p14="http://schemas.microsoft.com/office/powerpoint/2010/main" Requires="p14">
+        <mc:AlternateContent xmlns:mc="http://schemas.openxmlformats.org/markup-compatibility/2006" xmlns:p14="http://schemas.microsoft.com/office/powerpoint/2010/main">
+          <mc:Choice Requires="p14">
             <p:contentPart p14:bwMode="auto" r:id="rId26">
               <p14:nvContentPartPr>
                 <p14:cNvPr id="2" name="Ink 1">
@@ -14416,7 +14416,7 @@
               </p14:xfrm>
             </p:contentPart>
           </mc:Choice>
-          <mc:Fallback>
+          <mc:Fallback xmlns="">
             <p:pic>
               <p:nvPicPr>
                 <p:cNvPr id="2" name="Ink 1">
@@ -14447,8 +14447,8 @@
             </p:pic>
           </mc:Fallback>
         </mc:AlternateContent>
-        <mc:AlternateContent xmlns:mc="http://schemas.openxmlformats.org/markup-compatibility/2006">
-          <mc:Choice xmlns:p14="http://schemas.microsoft.com/office/powerpoint/2010/main" Requires="p14">
+        <mc:AlternateContent xmlns:mc="http://schemas.openxmlformats.org/markup-compatibility/2006" xmlns:p14="http://schemas.microsoft.com/office/powerpoint/2010/main">
+          <mc:Choice Requires="p14">
             <p:contentPart p14:bwMode="auto" r:id="rId28">
               <p14:nvContentPartPr>
                 <p14:cNvPr id="4" name="Ink 3">
@@ -14467,7 +14467,7 @@
               </p14:xfrm>
             </p:contentPart>
           </mc:Choice>
-          <mc:Fallback>
+          <mc:Fallback xmlns="">
             <p:pic>
               <p:nvPicPr>
                 <p:cNvPr id="4" name="Ink 3">
@@ -15263,13 +15263,13 @@
     <p:bldLst>
       <p:bldP spid="5" grpId="0"/>
       <p:bldP spid="6" grpId="0"/>
-      <p:bldP spid="7" grpId="0"/>
-      <p:bldP spid="14" grpId="0"/>
+      <p:bldP spid="7" grpId="0" animBg="1"/>
+      <p:bldP spid="14" grpId="0" animBg="1"/>
       <p:bldP spid="15" grpId="0" animBg="1"/>
       <p:bldP spid="16" grpId="0"/>
       <p:bldP spid="10" grpId="0" animBg="1"/>
       <p:bldP spid="13" grpId="0"/>
-      <p:bldP spid="17" grpId="0"/>
+      <p:bldP spid="17" grpId="0" animBg="1"/>
       <p:bldP spid="26" grpId="0"/>
     </p:bldLst>
   </p:timing>
@@ -17182,8 +17182,8 @@
           <a:chExt cx="0" cy="0"/>
         </a:xfrm>
       </p:grpSpPr>
-      <mc:AlternateContent xmlns:mc="http://schemas.openxmlformats.org/markup-compatibility/2006">
-        <mc:Choice xmlns:a14="http://schemas.microsoft.com/office/drawing/2010/main" Requires="a14">
+      <mc:AlternateContent xmlns:mc="http://schemas.openxmlformats.org/markup-compatibility/2006" xmlns:a14="http://schemas.microsoft.com/office/drawing/2010/main">
+        <mc:Choice Requires="a14">
           <p:sp>
             <p:nvSpPr>
               <p:cNvPr id="24" name="TextBox 23">
@@ -17267,7 +17267,7 @@
             </p:txBody>
           </p:sp>
         </mc:Choice>
-        <mc:Fallback>
+        <mc:Fallback xmlns="">
           <p:sp>
             <p:nvSpPr>
               <p:cNvPr id="24" name="TextBox 23">
@@ -17315,8 +17315,8 @@
           </p:sp>
         </mc:Fallback>
       </mc:AlternateContent>
-      <mc:AlternateContent xmlns:mc="http://schemas.openxmlformats.org/markup-compatibility/2006">
-        <mc:Choice xmlns:a14="http://schemas.microsoft.com/office/drawing/2010/main" Requires="a14">
+      <mc:AlternateContent xmlns:mc="http://schemas.openxmlformats.org/markup-compatibility/2006" xmlns:a14="http://schemas.microsoft.com/office/drawing/2010/main">
+        <mc:Choice Requires="a14">
           <p:sp>
             <p:nvSpPr>
               <p:cNvPr id="27" name="TextBox 26">
@@ -17382,7 +17382,7 @@
             </p:txBody>
           </p:sp>
         </mc:Choice>
-        <mc:Fallback>
+        <mc:Fallback xmlns="">
           <p:sp>
             <p:nvSpPr>
               <p:cNvPr id="27" name="TextBox 26">
@@ -17469,8 +17469,8 @@
           </a:fontRef>
         </p:style>
       </p:cxnSp>
-      <mc:AlternateContent xmlns:mc="http://schemas.openxmlformats.org/markup-compatibility/2006">
-        <mc:Choice xmlns:a14="http://schemas.microsoft.com/office/drawing/2010/main" Requires="a14">
+      <mc:AlternateContent xmlns:mc="http://schemas.openxmlformats.org/markup-compatibility/2006" xmlns:a14="http://schemas.microsoft.com/office/drawing/2010/main">
+        <mc:Choice Requires="a14">
           <p:sp>
             <p:nvSpPr>
               <p:cNvPr id="22" name="TextBox 21">
@@ -17588,13 +17588,7 @@
                         <a:rPr lang="en-GB" sz="2400" b="0" i="1" dirty="0" smtClean="0">
                           <a:latin typeface="Cambria Math" panose="02040503050406030204" pitchFamily="18" charset="0"/>
                         </a:rPr>
-                        <m:t>+</m:t>
-                      </m:r>
-                      <m:r>
-                        <a:rPr lang="en-GB" sz="2400" b="0" i="1" dirty="0" smtClean="0">
-                          <a:latin typeface="Cambria Math" panose="02040503050406030204" pitchFamily="18" charset="0"/>
-                        </a:rPr>
-                        <m:t>2</m:t>
+                        <m:t>+2</m:t>
                       </m:r>
                       <m:r>
                         <a:rPr lang="en-GB" sz="2400" b="0" i="1" dirty="0" smtClean="0">
@@ -17616,7 +17610,7 @@
             </p:txBody>
           </p:sp>
         </mc:Choice>
-        <mc:Fallback>
+        <mc:Fallback xmlns="">
           <p:sp>
             <p:nvSpPr>
               <p:cNvPr id="22" name="TextBox 21">
@@ -17805,8 +17799,8 @@
             <a:chExt cx="5031720" cy="222840"/>
           </a:xfrm>
         </p:grpSpPr>
-        <mc:AlternateContent xmlns:mc="http://schemas.openxmlformats.org/markup-compatibility/2006">
-          <mc:Choice xmlns:p14="http://schemas.microsoft.com/office/powerpoint/2010/main" Requires="p14">
+        <mc:AlternateContent xmlns:mc="http://schemas.openxmlformats.org/markup-compatibility/2006" xmlns:p14="http://schemas.microsoft.com/office/powerpoint/2010/main">
+          <mc:Choice Requires="p14">
             <p:contentPart p14:bwMode="auto" r:id="rId8">
               <p14:nvContentPartPr>
                 <p14:cNvPr id="23" name="Ink 22">
@@ -17825,7 +17819,7 @@
               </p14:xfrm>
             </p:contentPart>
           </mc:Choice>
-          <mc:Fallback>
+          <mc:Fallback xmlns="">
             <p:pic>
               <p:nvPicPr>
                 <p:cNvPr id="23" name="Ink 22">
@@ -17856,8 +17850,8 @@
             </p:pic>
           </mc:Fallback>
         </mc:AlternateContent>
-        <mc:AlternateContent xmlns:mc="http://schemas.openxmlformats.org/markup-compatibility/2006">
-          <mc:Choice xmlns:p14="http://schemas.microsoft.com/office/powerpoint/2010/main" Requires="p14">
+        <mc:AlternateContent xmlns:mc="http://schemas.openxmlformats.org/markup-compatibility/2006" xmlns:p14="http://schemas.microsoft.com/office/powerpoint/2010/main">
+          <mc:Choice Requires="p14">
             <p:contentPart p14:bwMode="auto" r:id="rId10">
               <p14:nvContentPartPr>
                 <p14:cNvPr id="25" name="Ink 24">
@@ -17876,7 +17870,7 @@
               </p14:xfrm>
             </p:contentPart>
           </mc:Choice>
-          <mc:Fallback>
+          <mc:Fallback xmlns="">
             <p:pic>
               <p:nvPicPr>
                 <p:cNvPr id="25" name="Ink 24">
@@ -17907,8 +17901,8 @@
             </p:pic>
           </mc:Fallback>
         </mc:AlternateContent>
-        <mc:AlternateContent xmlns:mc="http://schemas.openxmlformats.org/markup-compatibility/2006">
-          <mc:Choice xmlns:p14="http://schemas.microsoft.com/office/powerpoint/2010/main" Requires="p14">
+        <mc:AlternateContent xmlns:mc="http://schemas.openxmlformats.org/markup-compatibility/2006" xmlns:p14="http://schemas.microsoft.com/office/powerpoint/2010/main">
+          <mc:Choice Requires="p14">
             <p:contentPart p14:bwMode="auto" r:id="rId12">
               <p14:nvContentPartPr>
                 <p14:cNvPr id="26" name="Ink 25">
@@ -17927,7 +17921,7 @@
               </p14:xfrm>
             </p:contentPart>
           </mc:Choice>
-          <mc:Fallback>
+          <mc:Fallback xmlns="">
             <p:pic>
               <p:nvPicPr>
                 <p:cNvPr id="26" name="Ink 25">
@@ -17979,8 +17973,8 @@
             <a:chExt cx="3549960" cy="217080"/>
           </a:xfrm>
         </p:grpSpPr>
-        <mc:AlternateContent xmlns:mc="http://schemas.openxmlformats.org/markup-compatibility/2006">
-          <mc:Choice xmlns:p14="http://schemas.microsoft.com/office/powerpoint/2010/main" Requires="p14">
+        <mc:AlternateContent xmlns:mc="http://schemas.openxmlformats.org/markup-compatibility/2006" xmlns:p14="http://schemas.microsoft.com/office/powerpoint/2010/main">
+          <mc:Choice Requires="p14">
             <p:contentPart p14:bwMode="auto" r:id="rId14">
               <p14:nvContentPartPr>
                 <p14:cNvPr id="30" name="Ink 29">
@@ -17999,7 +17993,7 @@
               </p14:xfrm>
             </p:contentPart>
           </mc:Choice>
-          <mc:Fallback>
+          <mc:Fallback xmlns="">
             <p:pic>
               <p:nvPicPr>
                 <p:cNvPr id="30" name="Ink 29">
@@ -18030,8 +18024,8 @@
             </p:pic>
           </mc:Fallback>
         </mc:AlternateContent>
-        <mc:AlternateContent xmlns:mc="http://schemas.openxmlformats.org/markup-compatibility/2006">
-          <mc:Choice xmlns:p14="http://schemas.microsoft.com/office/powerpoint/2010/main" Requires="p14">
+        <mc:AlternateContent xmlns:mc="http://schemas.openxmlformats.org/markup-compatibility/2006" xmlns:p14="http://schemas.microsoft.com/office/powerpoint/2010/main">
+          <mc:Choice Requires="p14">
             <p:contentPart p14:bwMode="auto" r:id="rId16">
               <p14:nvContentPartPr>
                 <p14:cNvPr id="31" name="Ink 30">
@@ -18050,7 +18044,7 @@
               </p14:xfrm>
             </p:contentPart>
           </mc:Choice>
-          <mc:Fallback>
+          <mc:Fallback xmlns="">
             <p:pic>
               <p:nvPicPr>
                 <p:cNvPr id="31" name="Ink 30">
@@ -18081,8 +18075,8 @@
             </p:pic>
           </mc:Fallback>
         </mc:AlternateContent>
-        <mc:AlternateContent xmlns:mc="http://schemas.openxmlformats.org/markup-compatibility/2006">
-          <mc:Choice xmlns:p14="http://schemas.microsoft.com/office/powerpoint/2010/main" Requires="p14">
+        <mc:AlternateContent xmlns:mc="http://schemas.openxmlformats.org/markup-compatibility/2006" xmlns:p14="http://schemas.microsoft.com/office/powerpoint/2010/main">
+          <mc:Choice Requires="p14">
             <p:contentPart p14:bwMode="auto" r:id="rId18">
               <p14:nvContentPartPr>
                 <p14:cNvPr id="33" name="Ink 32">
@@ -18101,7 +18095,7 @@
               </p14:xfrm>
             </p:contentPart>
           </mc:Choice>
-          <mc:Fallback>
+          <mc:Fallback xmlns="">
             <p:pic>
               <p:nvPicPr>
                 <p:cNvPr id="33" name="Ink 32">
@@ -18153,8 +18147,8 @@
             <a:chExt cx="3508920" cy="241920"/>
           </a:xfrm>
         </p:grpSpPr>
-        <mc:AlternateContent xmlns:mc="http://schemas.openxmlformats.org/markup-compatibility/2006">
-          <mc:Choice xmlns:p14="http://schemas.microsoft.com/office/powerpoint/2010/main" Requires="p14">
+        <mc:AlternateContent xmlns:mc="http://schemas.openxmlformats.org/markup-compatibility/2006" xmlns:p14="http://schemas.microsoft.com/office/powerpoint/2010/main">
+          <mc:Choice Requires="p14">
             <p:contentPart p14:bwMode="auto" r:id="rId20">
               <p14:nvContentPartPr>
                 <p14:cNvPr id="35" name="Ink 34">
@@ -18173,7 +18167,7 @@
               </p14:xfrm>
             </p:contentPart>
           </mc:Choice>
-          <mc:Fallback>
+          <mc:Fallback xmlns="">
             <p:pic>
               <p:nvPicPr>
                 <p:cNvPr id="35" name="Ink 34">
@@ -18204,8 +18198,8 @@
             </p:pic>
           </mc:Fallback>
         </mc:AlternateContent>
-        <mc:AlternateContent xmlns:mc="http://schemas.openxmlformats.org/markup-compatibility/2006">
-          <mc:Choice xmlns:p14="http://schemas.microsoft.com/office/powerpoint/2010/main" Requires="p14">
+        <mc:AlternateContent xmlns:mc="http://schemas.openxmlformats.org/markup-compatibility/2006" xmlns:p14="http://schemas.microsoft.com/office/powerpoint/2010/main">
+          <mc:Choice Requires="p14">
             <p:contentPart p14:bwMode="auto" r:id="rId22">
               <p14:nvContentPartPr>
                 <p14:cNvPr id="36" name="Ink 35">
@@ -18224,7 +18218,7 @@
               </p14:xfrm>
             </p:contentPart>
           </mc:Choice>
-          <mc:Fallback>
+          <mc:Fallback xmlns="">
             <p:pic>
               <p:nvPicPr>
                 <p:cNvPr id="36" name="Ink 35">
@@ -18255,8 +18249,8 @@
             </p:pic>
           </mc:Fallback>
         </mc:AlternateContent>
-        <mc:AlternateContent xmlns:mc="http://schemas.openxmlformats.org/markup-compatibility/2006">
-          <mc:Choice xmlns:p14="http://schemas.microsoft.com/office/powerpoint/2010/main" Requires="p14">
+        <mc:AlternateContent xmlns:mc="http://schemas.openxmlformats.org/markup-compatibility/2006" xmlns:p14="http://schemas.microsoft.com/office/powerpoint/2010/main">
+          <mc:Choice Requires="p14">
             <p:contentPart p14:bwMode="auto" r:id="rId24">
               <p14:nvContentPartPr>
                 <p14:cNvPr id="38" name="Ink 37">
@@ -18275,7 +18269,7 @@
               </p14:xfrm>
             </p:contentPart>
           </mc:Choice>
-          <mc:Fallback>
+          <mc:Fallback xmlns="">
             <p:pic>
               <p:nvPicPr>
                 <p:cNvPr id="38" name="Ink 37">
@@ -18327,8 +18321,8 @@
             <a:chExt cx="5032800" cy="218160"/>
           </a:xfrm>
         </p:grpSpPr>
-        <mc:AlternateContent xmlns:mc="http://schemas.openxmlformats.org/markup-compatibility/2006">
-          <mc:Choice xmlns:p14="http://schemas.microsoft.com/office/powerpoint/2010/main" Requires="p14">
+        <mc:AlternateContent xmlns:mc="http://schemas.openxmlformats.org/markup-compatibility/2006" xmlns:p14="http://schemas.microsoft.com/office/powerpoint/2010/main">
+          <mc:Choice Requires="p14">
             <p:contentPart p14:bwMode="auto" r:id="rId26">
               <p14:nvContentPartPr>
                 <p14:cNvPr id="40" name="Ink 39">
@@ -18347,7 +18341,7 @@
               </p14:xfrm>
             </p:contentPart>
           </mc:Choice>
-          <mc:Fallback>
+          <mc:Fallback xmlns="">
             <p:pic>
               <p:nvPicPr>
                 <p:cNvPr id="40" name="Ink 39">
@@ -18378,8 +18372,8 @@
             </p:pic>
           </mc:Fallback>
         </mc:AlternateContent>
-        <mc:AlternateContent xmlns:mc="http://schemas.openxmlformats.org/markup-compatibility/2006">
-          <mc:Choice xmlns:p14="http://schemas.microsoft.com/office/powerpoint/2010/main" Requires="p14">
+        <mc:AlternateContent xmlns:mc="http://schemas.openxmlformats.org/markup-compatibility/2006" xmlns:p14="http://schemas.microsoft.com/office/powerpoint/2010/main">
+          <mc:Choice Requires="p14">
             <p:contentPart p14:bwMode="auto" r:id="rId28">
               <p14:nvContentPartPr>
                 <p14:cNvPr id="41" name="Ink 40">
@@ -18398,7 +18392,7 @@
               </p14:xfrm>
             </p:contentPart>
           </mc:Choice>
-          <mc:Fallback>
+          <mc:Fallback xmlns="">
             <p:pic>
               <p:nvPicPr>
                 <p:cNvPr id="41" name="Ink 40">
@@ -18429,8 +18423,8 @@
             </p:pic>
           </mc:Fallback>
         </mc:AlternateContent>
-        <mc:AlternateContent xmlns:mc="http://schemas.openxmlformats.org/markup-compatibility/2006">
-          <mc:Choice xmlns:p14="http://schemas.microsoft.com/office/powerpoint/2010/main" Requires="p14">
+        <mc:AlternateContent xmlns:mc="http://schemas.openxmlformats.org/markup-compatibility/2006" xmlns:p14="http://schemas.microsoft.com/office/powerpoint/2010/main">
+          <mc:Choice Requires="p14">
             <p:contentPart p14:bwMode="auto" r:id="rId30">
               <p14:nvContentPartPr>
                 <p14:cNvPr id="43" name="Ink 42">
@@ -18449,7 +18443,7 @@
               </p14:xfrm>
             </p:contentPart>
           </mc:Choice>
-          <mc:Fallback>
+          <mc:Fallback xmlns="">
             <p:pic>
               <p:nvPicPr>
                 <p:cNvPr id="43" name="Ink 42">
@@ -18480,8 +18474,8 @@
             </p:pic>
           </mc:Fallback>
         </mc:AlternateContent>
-        <mc:AlternateContent xmlns:mc="http://schemas.openxmlformats.org/markup-compatibility/2006">
-          <mc:Choice xmlns:p14="http://schemas.microsoft.com/office/powerpoint/2010/main" Requires="p14">
+        <mc:AlternateContent xmlns:mc="http://schemas.openxmlformats.org/markup-compatibility/2006" xmlns:p14="http://schemas.microsoft.com/office/powerpoint/2010/main">
+          <mc:Choice Requires="p14">
             <p:contentPart p14:bwMode="auto" r:id="rId32">
               <p14:nvContentPartPr>
                 <p14:cNvPr id="45" name="Ink 44">
@@ -18500,7 +18494,7 @@
               </p14:xfrm>
             </p:contentPart>
           </mc:Choice>
-          <mc:Fallback>
+          <mc:Fallback xmlns="">
             <p:pic>
               <p:nvPicPr>
                 <p:cNvPr id="45" name="Ink 44">
@@ -18532,8 +18526,8 @@
           </mc:Fallback>
         </mc:AlternateContent>
       </p:grpSp>
-      <mc:AlternateContent xmlns:mc="http://schemas.openxmlformats.org/markup-compatibility/2006">
-        <mc:Choice xmlns:a14="http://schemas.microsoft.com/office/drawing/2010/main" Requires="a14">
+      <mc:AlternateContent xmlns:mc="http://schemas.openxmlformats.org/markup-compatibility/2006" xmlns:a14="http://schemas.microsoft.com/office/drawing/2010/main">
+        <mc:Choice Requires="a14">
           <p:sp>
             <p:nvSpPr>
               <p:cNvPr id="47" name="TextBox 46">
@@ -18605,7 +18599,7 @@
             </p:txBody>
           </p:sp>
         </mc:Choice>
-        <mc:Fallback>
+        <mc:Fallback xmlns="">
           <p:sp>
             <p:nvSpPr>
               <p:cNvPr id="47" name="TextBox 46">
@@ -18653,8 +18647,8 @@
           </p:sp>
         </mc:Fallback>
       </mc:AlternateContent>
-      <mc:AlternateContent xmlns:mc="http://schemas.openxmlformats.org/markup-compatibility/2006">
-        <mc:Choice xmlns:a14="http://schemas.microsoft.com/office/drawing/2010/main" Requires="a14">
+      <mc:AlternateContent xmlns:mc="http://schemas.openxmlformats.org/markup-compatibility/2006" xmlns:a14="http://schemas.microsoft.com/office/drawing/2010/main">
+        <mc:Choice Requires="a14">
           <p:sp>
             <p:nvSpPr>
               <p:cNvPr id="48" name="TextBox 47">
@@ -18720,7 +18714,7 @@
             </p:txBody>
           </p:sp>
         </mc:Choice>
-        <mc:Fallback>
+        <mc:Fallback xmlns="">
           <p:sp>
             <p:nvSpPr>
               <p:cNvPr id="48" name="TextBox 47">
@@ -18768,8 +18762,8 @@
           </p:sp>
         </mc:Fallback>
       </mc:AlternateContent>
-      <mc:AlternateContent xmlns:mc="http://schemas.openxmlformats.org/markup-compatibility/2006">
-        <mc:Choice xmlns:a14="http://schemas.microsoft.com/office/drawing/2010/main" Requires="a14">
+      <mc:AlternateContent xmlns:mc="http://schemas.openxmlformats.org/markup-compatibility/2006" xmlns:a14="http://schemas.microsoft.com/office/drawing/2010/main">
+        <mc:Choice Requires="a14">
           <p:sp>
             <p:nvSpPr>
               <p:cNvPr id="49" name="TextBox 48">
@@ -18909,7 +18903,7 @@
             </p:txBody>
           </p:sp>
         </mc:Choice>
-        <mc:Fallback>
+        <mc:Fallback xmlns="">
           <p:sp>
             <p:nvSpPr>
               <p:cNvPr id="49" name="TextBox 48">
@@ -18961,8 +18955,8 @@
           </p:sp>
         </mc:Fallback>
       </mc:AlternateContent>
-      <mc:AlternateContent xmlns:mc="http://schemas.openxmlformats.org/markup-compatibility/2006">
-        <mc:Choice xmlns:a14="http://schemas.microsoft.com/office/drawing/2010/main" Requires="a14">
+      <mc:AlternateContent xmlns:mc="http://schemas.openxmlformats.org/markup-compatibility/2006" xmlns:a14="http://schemas.microsoft.com/office/drawing/2010/main">
+        <mc:Choice Requires="a14">
           <p:sp>
             <p:nvSpPr>
               <p:cNvPr id="53" name="TextBox 52">
@@ -19103,7 +19097,7 @@
             </p:txBody>
           </p:sp>
         </mc:Choice>
-        <mc:Fallback>
+        <mc:Fallback xmlns="">
           <p:sp>
             <p:nvSpPr>
               <p:cNvPr id="53" name="TextBox 52">
@@ -19864,8 +19858,8 @@
           <a:chExt cx="0" cy="0"/>
         </a:xfrm>
       </p:grpSpPr>
-      <mc:AlternateContent xmlns:mc="http://schemas.openxmlformats.org/markup-compatibility/2006">
-        <mc:Choice xmlns:a14="http://schemas.microsoft.com/office/drawing/2010/main" Requires="a14">
+      <mc:AlternateContent xmlns:mc="http://schemas.openxmlformats.org/markup-compatibility/2006" xmlns:a14="http://schemas.microsoft.com/office/drawing/2010/main">
+        <mc:Choice Requires="a14">
           <p:sp>
             <p:nvSpPr>
               <p:cNvPr id="2" name="TextBox 1">
@@ -20073,7 +20067,7 @@
             </p:txBody>
           </p:sp>
         </mc:Choice>
-        <mc:Fallback>
+        <mc:Fallback xmlns="">
           <p:sp>
             <p:nvSpPr>
               <p:cNvPr id="2" name="TextBox 1">
@@ -20503,8 +20497,8 @@
           <a:chExt cx="0" cy="0"/>
         </a:xfrm>
       </p:grpSpPr>
-      <mc:AlternateContent xmlns:mc="http://schemas.openxmlformats.org/markup-compatibility/2006">
-        <mc:Choice xmlns:a14="http://schemas.microsoft.com/office/drawing/2010/main" Requires="a14">
+      <mc:AlternateContent xmlns:mc="http://schemas.openxmlformats.org/markup-compatibility/2006" xmlns:a14="http://schemas.microsoft.com/office/drawing/2010/main">
+        <mc:Choice Requires="a14">
           <p:sp>
             <p:nvSpPr>
               <p:cNvPr id="4" name="TextBox 3">
@@ -20590,7 +20584,7 @@
             </p:txBody>
           </p:sp>
         </mc:Choice>
-        <mc:Fallback>
+        <mc:Fallback xmlns="">
           <p:sp>
             <p:nvSpPr>
               <p:cNvPr id="4" name="TextBox 3">
@@ -20660,8 +20654,8 @@
             <a:chExt cx="3297911" cy="867209"/>
           </a:xfrm>
         </p:grpSpPr>
-        <mc:AlternateContent xmlns:mc="http://schemas.openxmlformats.org/markup-compatibility/2006">
-          <mc:Choice xmlns:a14="http://schemas.microsoft.com/office/drawing/2010/main" Requires="a14">
+        <mc:AlternateContent xmlns:mc="http://schemas.openxmlformats.org/markup-compatibility/2006" xmlns:a14="http://schemas.microsoft.com/office/drawing/2010/main">
+          <mc:Choice Requires="a14">
             <p:sp>
               <p:nvSpPr>
                 <p:cNvPr id="6" name="TextBox 5">
@@ -20729,7 +20723,7 @@
               </p:txBody>
             </p:sp>
           </mc:Choice>
-          <mc:Fallback>
+          <mc:Fallback xmlns="">
             <p:sp>
               <p:nvSpPr>
                 <p:cNvPr id="6" name="TextBox 5">
@@ -20779,8 +20773,8 @@
             </p:sp>
           </mc:Fallback>
         </mc:AlternateContent>
-        <mc:AlternateContent xmlns:mc="http://schemas.openxmlformats.org/markup-compatibility/2006">
-          <mc:Choice xmlns:a14="http://schemas.microsoft.com/office/drawing/2010/main" Requires="a14">
+        <mc:AlternateContent xmlns:mc="http://schemas.openxmlformats.org/markup-compatibility/2006" xmlns:a14="http://schemas.microsoft.com/office/drawing/2010/main">
+          <mc:Choice Requires="a14">
             <p:sp>
               <p:nvSpPr>
                 <p:cNvPr id="7" name="TextBox 6">
@@ -20866,7 +20860,7 @@
               </p:txBody>
             </p:sp>
           </mc:Choice>
-          <mc:Fallback>
+          <mc:Fallback xmlns="">
             <p:sp>
               <p:nvSpPr>
                 <p:cNvPr id="7" name="TextBox 6">
@@ -21017,8 +21011,8 @@
             <a:chExt cx="2834011" cy="769844"/>
           </a:xfrm>
         </p:grpSpPr>
-        <mc:AlternateContent xmlns:mc="http://schemas.openxmlformats.org/markup-compatibility/2006">
-          <mc:Choice xmlns:a14="http://schemas.microsoft.com/office/drawing/2010/main" Requires="a14">
+        <mc:AlternateContent xmlns:mc="http://schemas.openxmlformats.org/markup-compatibility/2006" xmlns:a14="http://schemas.microsoft.com/office/drawing/2010/main">
+          <mc:Choice Requires="a14">
             <p:sp>
               <p:nvSpPr>
                 <p:cNvPr id="27" name="TextBox 26">
@@ -21092,7 +21086,7 @@
               </p:txBody>
             </p:sp>
           </mc:Choice>
-          <mc:Fallback>
+          <mc:Fallback xmlns="">
             <p:sp>
               <p:nvSpPr>
                 <p:cNvPr id="27" name="TextBox 26">
@@ -21142,8 +21136,8 @@
             </p:sp>
           </mc:Fallback>
         </mc:AlternateContent>
-        <mc:AlternateContent xmlns:mc="http://schemas.openxmlformats.org/markup-compatibility/2006">
-          <mc:Choice xmlns:a14="http://schemas.microsoft.com/office/drawing/2010/main" Requires="a14">
+        <mc:AlternateContent xmlns:mc="http://schemas.openxmlformats.org/markup-compatibility/2006" xmlns:a14="http://schemas.microsoft.com/office/drawing/2010/main">
+          <mc:Choice Requires="a14">
             <p:sp>
               <p:nvSpPr>
                 <p:cNvPr id="28" name="TextBox 27">
@@ -21229,7 +21223,7 @@
               </p:txBody>
             </p:sp>
           </mc:Choice>
-          <mc:Fallback>
+          <mc:Fallback xmlns="">
             <p:sp>
               <p:nvSpPr>
                 <p:cNvPr id="28" name="TextBox 27">
@@ -21380,8 +21374,8 @@
             <a:chExt cx="3005448" cy="916758"/>
           </a:xfrm>
         </p:grpSpPr>
-        <mc:AlternateContent xmlns:mc="http://schemas.openxmlformats.org/markup-compatibility/2006">
-          <mc:Choice xmlns:a14="http://schemas.microsoft.com/office/drawing/2010/main" Requires="a14">
+        <mc:AlternateContent xmlns:mc="http://schemas.openxmlformats.org/markup-compatibility/2006" xmlns:a14="http://schemas.microsoft.com/office/drawing/2010/main">
+          <mc:Choice Requires="a14">
             <p:sp>
               <p:nvSpPr>
                 <p:cNvPr id="74" name="TextBox 73">
@@ -21467,7 +21461,7 @@
               </p:txBody>
             </p:sp>
           </mc:Choice>
-          <mc:Fallback>
+          <mc:Fallback xmlns="">
             <p:sp>
               <p:nvSpPr>
                 <p:cNvPr id="74" name="TextBox 73">
@@ -21557,8 +21551,8 @@
             </a:fontRef>
           </p:style>
         </p:cxnSp>
-        <mc:AlternateContent xmlns:mc="http://schemas.openxmlformats.org/markup-compatibility/2006">
-          <mc:Choice xmlns:a14="http://schemas.microsoft.com/office/drawing/2010/main" Requires="a14">
+        <mc:AlternateContent xmlns:mc="http://schemas.openxmlformats.org/markup-compatibility/2006" xmlns:a14="http://schemas.microsoft.com/office/drawing/2010/main">
+          <mc:Choice Requires="a14">
             <p:sp>
               <p:nvSpPr>
                 <p:cNvPr id="78" name="TextBox 77">
@@ -21632,7 +21626,7 @@
               </p:txBody>
             </p:sp>
           </mc:Choice>
-          <mc:Fallback>
+          <mc:Fallback xmlns="">
             <p:sp>
               <p:nvSpPr>
                 <p:cNvPr id="78" name="TextBox 77">
@@ -21759,8 +21753,8 @@
           </a:prstGeom>
         </p:spPr>
       </p:pic>
-      <mc:AlternateContent xmlns:mc="http://schemas.openxmlformats.org/markup-compatibility/2006">
-        <mc:Choice xmlns:a14="http://schemas.microsoft.com/office/drawing/2010/main" Requires="a14">
+      <mc:AlternateContent xmlns:mc="http://schemas.openxmlformats.org/markup-compatibility/2006" xmlns:a14="http://schemas.microsoft.com/office/drawing/2010/main">
+        <mc:Choice Requires="a14">
           <p:sp>
             <p:nvSpPr>
               <p:cNvPr id="81" name="TextBox 80">
@@ -21824,7 +21818,7 @@
             </p:txBody>
           </p:sp>
         </mc:Choice>
-        <mc:Fallback>
+        <mc:Fallback xmlns="">
           <p:sp>
             <p:nvSpPr>
               <p:cNvPr id="81" name="TextBox 80">
@@ -21869,8 +21863,8 @@
           </p:sp>
         </mc:Fallback>
       </mc:AlternateContent>
-      <mc:AlternateContent xmlns:mc="http://schemas.openxmlformats.org/markup-compatibility/2006">
-        <mc:Choice xmlns:a14="http://schemas.microsoft.com/office/drawing/2010/main" Requires="a14">
+      <mc:AlternateContent xmlns:mc="http://schemas.openxmlformats.org/markup-compatibility/2006" xmlns:a14="http://schemas.microsoft.com/office/drawing/2010/main">
+        <mc:Choice Requires="a14">
           <p:sp>
             <p:nvSpPr>
               <p:cNvPr id="82" name="TextBox 81">
@@ -21944,7 +21938,7 @@
             </p:txBody>
           </p:sp>
         </mc:Choice>
-        <mc:Fallback>
+        <mc:Fallback xmlns="">
           <p:sp>
             <p:nvSpPr>
               <p:cNvPr id="82" name="TextBox 81">
@@ -22014,8 +22008,8 @@
             <a:chExt cx="2149375" cy="684443"/>
           </a:xfrm>
         </p:grpSpPr>
-        <mc:AlternateContent xmlns:mc="http://schemas.openxmlformats.org/markup-compatibility/2006">
-          <mc:Choice xmlns:a14="http://schemas.microsoft.com/office/drawing/2010/main" Requires="a14">
+        <mc:AlternateContent xmlns:mc="http://schemas.openxmlformats.org/markup-compatibility/2006" xmlns:a14="http://schemas.microsoft.com/office/drawing/2010/main">
+          <mc:Choice Requires="a14">
             <p:sp>
               <p:nvSpPr>
                 <p:cNvPr id="87" name="TextBox 86">
@@ -22083,7 +22077,7 @@
               </p:txBody>
             </p:sp>
           </mc:Choice>
-          <mc:Fallback>
+          <mc:Fallback xmlns="">
             <p:sp>
               <p:nvSpPr>
                 <p:cNvPr id="87" name="TextBox 86">
@@ -22133,8 +22127,8 @@
             </p:sp>
           </mc:Fallback>
         </mc:AlternateContent>
-        <mc:AlternateContent xmlns:mc="http://schemas.openxmlformats.org/markup-compatibility/2006">
-          <mc:Choice xmlns:a14="http://schemas.microsoft.com/office/drawing/2010/main" Requires="a14">
+        <mc:AlternateContent xmlns:mc="http://schemas.openxmlformats.org/markup-compatibility/2006" xmlns:a14="http://schemas.microsoft.com/office/drawing/2010/main">
+          <mc:Choice Requires="a14">
             <p:sp>
               <p:nvSpPr>
                 <p:cNvPr id="88" name="TextBox 87">
@@ -22208,7 +22202,7 @@
               </p:txBody>
             </p:sp>
           </mc:Choice>
-          <mc:Fallback>
+          <mc:Fallback xmlns="">
             <p:sp>
               <p:nvSpPr>
                 <p:cNvPr id="88" name="TextBox 87">
@@ -22359,8 +22353,8 @@
             <a:chExt cx="2224591" cy="682187"/>
           </a:xfrm>
         </p:grpSpPr>
-        <mc:AlternateContent xmlns:mc="http://schemas.openxmlformats.org/markup-compatibility/2006">
-          <mc:Choice xmlns:a14="http://schemas.microsoft.com/office/drawing/2010/main" Requires="a14">
+        <mc:AlternateContent xmlns:mc="http://schemas.openxmlformats.org/markup-compatibility/2006" xmlns:a14="http://schemas.microsoft.com/office/drawing/2010/main">
+          <mc:Choice Requires="a14">
             <p:sp>
               <p:nvSpPr>
                 <p:cNvPr id="97" name="TextBox 96">
@@ -22428,7 +22422,7 @@
               </p:txBody>
             </p:sp>
           </mc:Choice>
-          <mc:Fallback>
+          <mc:Fallback xmlns="">
             <p:sp>
               <p:nvSpPr>
                 <p:cNvPr id="97" name="TextBox 96">
@@ -22478,8 +22472,8 @@
             </p:sp>
           </mc:Fallback>
         </mc:AlternateContent>
-        <mc:AlternateContent xmlns:mc="http://schemas.openxmlformats.org/markup-compatibility/2006">
-          <mc:Choice xmlns:a14="http://schemas.microsoft.com/office/drawing/2010/main" Requires="a14">
+        <mc:AlternateContent xmlns:mc="http://schemas.openxmlformats.org/markup-compatibility/2006" xmlns:a14="http://schemas.microsoft.com/office/drawing/2010/main">
+          <mc:Choice Requires="a14">
             <p:sp>
               <p:nvSpPr>
                 <p:cNvPr id="98" name="TextBox 97">
@@ -22553,7 +22547,7 @@
               </p:txBody>
             </p:sp>
           </mc:Choice>
-          <mc:Fallback>
+          <mc:Fallback xmlns="">
             <p:sp>
               <p:nvSpPr>
                 <p:cNvPr id="98" name="TextBox 97">
@@ -23355,8 +23349,8 @@
             <a:chExt cx="6377508" cy="6278594"/>
           </a:xfrm>
         </p:grpSpPr>
-        <mc:AlternateContent xmlns:mc="http://schemas.openxmlformats.org/markup-compatibility/2006">
-          <mc:Choice xmlns:a14="http://schemas.microsoft.com/office/drawing/2010/main" Requires="a14">
+        <mc:AlternateContent xmlns:mc="http://schemas.openxmlformats.org/markup-compatibility/2006" xmlns:a14="http://schemas.microsoft.com/office/drawing/2010/main">
+          <mc:Choice Requires="a14">
             <p:sp>
               <p:nvSpPr>
                 <p:cNvPr id="4" name="TextBox 3">
@@ -23442,7 +23436,7 @@
               </p:txBody>
             </p:sp>
           </mc:Choice>
-          <mc:Fallback>
+          <mc:Fallback xmlns="">
             <p:sp>
               <p:nvSpPr>
                 <p:cNvPr id="4" name="TextBox 3">
@@ -23492,8 +23486,8 @@
             </p:sp>
           </mc:Fallback>
         </mc:AlternateContent>
-        <mc:AlternateContent xmlns:mc="http://schemas.openxmlformats.org/markup-compatibility/2006">
-          <mc:Choice xmlns:a14="http://schemas.microsoft.com/office/drawing/2010/main" Requires="a14">
+        <mc:AlternateContent xmlns:mc="http://schemas.openxmlformats.org/markup-compatibility/2006" xmlns:a14="http://schemas.microsoft.com/office/drawing/2010/main">
+          <mc:Choice Requires="a14">
             <p:sp>
               <p:nvSpPr>
                 <p:cNvPr id="6" name="TextBox 5">
@@ -23561,7 +23555,7 @@
               </p:txBody>
             </p:sp>
           </mc:Choice>
-          <mc:Fallback>
+          <mc:Fallback xmlns="">
             <p:sp>
               <p:nvSpPr>
                 <p:cNvPr id="6" name="TextBox 5">
@@ -23611,8 +23605,8 @@
             </p:sp>
           </mc:Fallback>
         </mc:AlternateContent>
-        <mc:AlternateContent xmlns:mc="http://schemas.openxmlformats.org/markup-compatibility/2006">
-          <mc:Choice xmlns:a14="http://schemas.microsoft.com/office/drawing/2010/main" Requires="a14">
+        <mc:AlternateContent xmlns:mc="http://schemas.openxmlformats.org/markup-compatibility/2006" xmlns:a14="http://schemas.microsoft.com/office/drawing/2010/main">
+          <mc:Choice Requires="a14">
             <p:sp>
               <p:nvSpPr>
                 <p:cNvPr id="7" name="TextBox 6">
@@ -23698,7 +23692,7 @@
               </p:txBody>
             </p:sp>
           </mc:Choice>
-          <mc:Fallback>
+          <mc:Fallback xmlns="">
             <p:sp>
               <p:nvSpPr>
                 <p:cNvPr id="7" name="TextBox 6">
@@ -23828,8 +23822,8 @@
             </a:fontRef>
           </p:style>
         </p:cxnSp>
-        <mc:AlternateContent xmlns:mc="http://schemas.openxmlformats.org/markup-compatibility/2006">
-          <mc:Choice xmlns:a14="http://schemas.microsoft.com/office/drawing/2010/main" Requires="a14">
+        <mc:AlternateContent xmlns:mc="http://schemas.openxmlformats.org/markup-compatibility/2006" xmlns:a14="http://schemas.microsoft.com/office/drawing/2010/main">
+          <mc:Choice Requires="a14">
             <p:sp>
               <p:nvSpPr>
                 <p:cNvPr id="27" name="TextBox 26">
@@ -23903,7 +23897,7 @@
               </p:txBody>
             </p:sp>
           </mc:Choice>
-          <mc:Fallback>
+          <mc:Fallback xmlns="">
             <p:sp>
               <p:nvSpPr>
                 <p:cNvPr id="27" name="TextBox 26">
@@ -23953,8 +23947,8 @@
             </p:sp>
           </mc:Fallback>
         </mc:AlternateContent>
-        <mc:AlternateContent xmlns:mc="http://schemas.openxmlformats.org/markup-compatibility/2006">
-          <mc:Choice xmlns:a14="http://schemas.microsoft.com/office/drawing/2010/main" Requires="a14">
+        <mc:AlternateContent xmlns:mc="http://schemas.openxmlformats.org/markup-compatibility/2006" xmlns:a14="http://schemas.microsoft.com/office/drawing/2010/main">
+          <mc:Choice Requires="a14">
             <p:sp>
               <p:nvSpPr>
                 <p:cNvPr id="28" name="TextBox 27">
@@ -24040,7 +24034,7 @@
               </p:txBody>
             </p:sp>
           </mc:Choice>
-          <mc:Fallback>
+          <mc:Fallback xmlns="">
             <p:sp>
               <p:nvSpPr>
                 <p:cNvPr id="28" name="TextBox 27">
@@ -24170,8 +24164,8 @@
             </a:fontRef>
           </p:style>
         </p:cxnSp>
-        <mc:AlternateContent xmlns:mc="http://schemas.openxmlformats.org/markup-compatibility/2006">
-          <mc:Choice xmlns:a14="http://schemas.microsoft.com/office/drawing/2010/main" Requires="a14">
+        <mc:AlternateContent xmlns:mc="http://schemas.openxmlformats.org/markup-compatibility/2006" xmlns:a14="http://schemas.microsoft.com/office/drawing/2010/main">
+          <mc:Choice Requires="a14">
             <p:sp>
               <p:nvSpPr>
                 <p:cNvPr id="74" name="TextBox 73">
@@ -24257,7 +24251,7 @@
               </p:txBody>
             </p:sp>
           </mc:Choice>
-          <mc:Fallback>
+          <mc:Fallback xmlns="">
             <p:sp>
               <p:nvSpPr>
                 <p:cNvPr id="74" name="TextBox 73">
@@ -24347,8 +24341,8 @@
             </a:fontRef>
           </p:style>
         </p:cxnSp>
-        <mc:AlternateContent xmlns:mc="http://schemas.openxmlformats.org/markup-compatibility/2006">
-          <mc:Choice xmlns:a14="http://schemas.microsoft.com/office/drawing/2010/main" Requires="a14">
+        <mc:AlternateContent xmlns:mc="http://schemas.openxmlformats.org/markup-compatibility/2006" xmlns:a14="http://schemas.microsoft.com/office/drawing/2010/main">
+          <mc:Choice Requires="a14">
             <p:sp>
               <p:nvSpPr>
                 <p:cNvPr id="78" name="TextBox 77">
@@ -24422,7 +24416,7 @@
               </p:txBody>
             </p:sp>
           </mc:Choice>
-          <mc:Fallback>
+          <mc:Fallback xmlns="">
             <p:sp>
               <p:nvSpPr>
                 <p:cNvPr id="78" name="TextBox 77">
@@ -24512,8 +24506,8 @@
             </a:fontRef>
           </p:style>
         </p:cxnSp>
-        <mc:AlternateContent xmlns:mc="http://schemas.openxmlformats.org/markup-compatibility/2006">
-          <mc:Choice xmlns:a14="http://schemas.microsoft.com/office/drawing/2010/main" Requires="a14">
+        <mc:AlternateContent xmlns:mc="http://schemas.openxmlformats.org/markup-compatibility/2006" xmlns:a14="http://schemas.microsoft.com/office/drawing/2010/main">
+          <mc:Choice Requires="a14">
             <p:sp>
               <p:nvSpPr>
                 <p:cNvPr id="81" name="TextBox 80">
@@ -24577,7 +24571,7 @@
               </p:txBody>
             </p:sp>
           </mc:Choice>
-          <mc:Fallback>
+          <mc:Fallback xmlns="">
             <p:sp>
               <p:nvSpPr>
                 <p:cNvPr id="81" name="TextBox 80">
@@ -24622,8 +24616,8 @@
             </p:sp>
           </mc:Fallback>
         </mc:AlternateContent>
-        <mc:AlternateContent xmlns:mc="http://schemas.openxmlformats.org/markup-compatibility/2006">
-          <mc:Choice xmlns:a14="http://schemas.microsoft.com/office/drawing/2010/main" Requires="a14">
+        <mc:AlternateContent xmlns:mc="http://schemas.openxmlformats.org/markup-compatibility/2006" xmlns:a14="http://schemas.microsoft.com/office/drawing/2010/main">
+          <mc:Choice Requires="a14">
             <p:sp>
               <p:nvSpPr>
                 <p:cNvPr id="82" name="TextBox 81">
@@ -24697,7 +24691,7 @@
               </p:txBody>
             </p:sp>
           </mc:Choice>
-          <mc:Fallback>
+          <mc:Fallback xmlns="">
             <p:sp>
               <p:nvSpPr>
                 <p:cNvPr id="82" name="TextBox 81">
@@ -24747,8 +24741,8 @@
             </p:sp>
           </mc:Fallback>
         </mc:AlternateContent>
-        <mc:AlternateContent xmlns:mc="http://schemas.openxmlformats.org/markup-compatibility/2006">
-          <mc:Choice xmlns:a14="http://schemas.microsoft.com/office/drawing/2010/main" Requires="a14">
+        <mc:AlternateContent xmlns:mc="http://schemas.openxmlformats.org/markup-compatibility/2006" xmlns:a14="http://schemas.microsoft.com/office/drawing/2010/main">
+          <mc:Choice Requires="a14">
             <p:sp>
               <p:nvSpPr>
                 <p:cNvPr id="87" name="TextBox 86">
@@ -24816,7 +24810,7 @@
               </p:txBody>
             </p:sp>
           </mc:Choice>
-          <mc:Fallback>
+          <mc:Fallback xmlns="">
             <p:sp>
               <p:nvSpPr>
                 <p:cNvPr id="87" name="TextBox 86">
@@ -24866,8 +24860,8 @@
             </p:sp>
           </mc:Fallback>
         </mc:AlternateContent>
-        <mc:AlternateContent xmlns:mc="http://schemas.openxmlformats.org/markup-compatibility/2006">
-          <mc:Choice xmlns:a14="http://schemas.microsoft.com/office/drawing/2010/main" Requires="a14">
+        <mc:AlternateContent xmlns:mc="http://schemas.openxmlformats.org/markup-compatibility/2006" xmlns:a14="http://schemas.microsoft.com/office/drawing/2010/main">
+          <mc:Choice Requires="a14">
             <p:sp>
               <p:nvSpPr>
                 <p:cNvPr id="88" name="TextBox 87">
@@ -24941,7 +24935,7 @@
               </p:txBody>
             </p:sp>
           </mc:Choice>
-          <mc:Fallback>
+          <mc:Fallback xmlns="">
             <p:sp>
               <p:nvSpPr>
                 <p:cNvPr id="88" name="TextBox 87">
@@ -25071,8 +25065,8 @@
             </a:fontRef>
           </p:style>
         </p:cxnSp>
-        <mc:AlternateContent xmlns:mc="http://schemas.openxmlformats.org/markup-compatibility/2006">
-          <mc:Choice xmlns:a14="http://schemas.microsoft.com/office/drawing/2010/main" Requires="a14">
+        <mc:AlternateContent xmlns:mc="http://schemas.openxmlformats.org/markup-compatibility/2006" xmlns:a14="http://schemas.microsoft.com/office/drawing/2010/main">
+          <mc:Choice Requires="a14">
             <p:sp>
               <p:nvSpPr>
                 <p:cNvPr id="97" name="TextBox 96">
@@ -25140,7 +25134,7 @@
               </p:txBody>
             </p:sp>
           </mc:Choice>
-          <mc:Fallback>
+          <mc:Fallback xmlns="">
             <p:sp>
               <p:nvSpPr>
                 <p:cNvPr id="97" name="TextBox 96">
@@ -25190,8 +25184,8 @@
             </p:sp>
           </mc:Fallback>
         </mc:AlternateContent>
-        <mc:AlternateContent xmlns:mc="http://schemas.openxmlformats.org/markup-compatibility/2006">
-          <mc:Choice xmlns:a14="http://schemas.microsoft.com/office/drawing/2010/main" Requires="a14">
+        <mc:AlternateContent xmlns:mc="http://schemas.openxmlformats.org/markup-compatibility/2006" xmlns:a14="http://schemas.microsoft.com/office/drawing/2010/main">
+          <mc:Choice Requires="a14">
             <p:sp>
               <p:nvSpPr>
                 <p:cNvPr id="98" name="TextBox 97">
@@ -25265,7 +25259,7 @@
               </p:txBody>
             </p:sp>
           </mc:Choice>
-          <mc:Fallback>
+          <mc:Fallback xmlns="">
             <p:sp>
               <p:nvSpPr>
                 <p:cNvPr id="98" name="TextBox 97">
@@ -25514,8 +25508,8 @@
             <a:chExt cx="3600000" cy="219600"/>
           </a:xfrm>
         </p:grpSpPr>
-        <mc:AlternateContent xmlns:mc="http://schemas.openxmlformats.org/markup-compatibility/2006">
-          <mc:Choice xmlns:p14="http://schemas.microsoft.com/office/powerpoint/2010/main" Requires="p14">
+        <mc:AlternateContent xmlns:mc="http://schemas.openxmlformats.org/markup-compatibility/2006" xmlns:p14="http://schemas.microsoft.com/office/powerpoint/2010/main">
+          <mc:Choice Requires="p14">
             <p:contentPart p14:bwMode="auto" r:id="rId17">
               <p14:nvContentPartPr>
                 <p14:cNvPr id="12" name="Ink 11">
@@ -25534,7 +25528,7 @@
               </p14:xfrm>
             </p:contentPart>
           </mc:Choice>
-          <mc:Fallback>
+          <mc:Fallback xmlns="">
             <p:pic>
               <p:nvPicPr>
                 <p:cNvPr id="12" name="Ink 11">
@@ -25565,8 +25559,8 @@
             </p:pic>
           </mc:Fallback>
         </mc:AlternateContent>
-        <mc:AlternateContent xmlns:mc="http://schemas.openxmlformats.org/markup-compatibility/2006">
-          <mc:Choice xmlns:p14="http://schemas.microsoft.com/office/powerpoint/2010/main" Requires="p14">
+        <mc:AlternateContent xmlns:mc="http://schemas.openxmlformats.org/markup-compatibility/2006" xmlns:p14="http://schemas.microsoft.com/office/powerpoint/2010/main">
+          <mc:Choice Requires="p14">
             <p:contentPart p14:bwMode="auto" r:id="rId19">
               <p14:nvContentPartPr>
                 <p14:cNvPr id="14" name="Ink 13">
@@ -25585,7 +25579,7 @@
               </p14:xfrm>
             </p:contentPart>
           </mc:Choice>
-          <mc:Fallback>
+          <mc:Fallback xmlns="">
             <p:pic>
               <p:nvPicPr>
                 <p:cNvPr id="14" name="Ink 13">
@@ -25616,8 +25610,8 @@
             </p:pic>
           </mc:Fallback>
         </mc:AlternateContent>
-        <mc:AlternateContent xmlns:mc="http://schemas.openxmlformats.org/markup-compatibility/2006">
-          <mc:Choice xmlns:p14="http://schemas.microsoft.com/office/powerpoint/2010/main" Requires="p14">
+        <mc:AlternateContent xmlns:mc="http://schemas.openxmlformats.org/markup-compatibility/2006" xmlns:p14="http://schemas.microsoft.com/office/powerpoint/2010/main">
+          <mc:Choice Requires="p14">
             <p:contentPart p14:bwMode="auto" r:id="rId21">
               <p14:nvContentPartPr>
                 <p14:cNvPr id="16" name="Ink 15">
@@ -25636,7 +25630,7 @@
               </p14:xfrm>
             </p:contentPart>
           </mc:Choice>
-          <mc:Fallback>
+          <mc:Fallback xmlns="">
             <p:pic>
               <p:nvPicPr>
                 <p:cNvPr id="16" name="Ink 15">
@@ -25688,8 +25682,8 @@
             <a:chExt cx="2826360" cy="231120"/>
           </a:xfrm>
         </p:grpSpPr>
-        <mc:AlternateContent xmlns:mc="http://schemas.openxmlformats.org/markup-compatibility/2006">
-          <mc:Choice xmlns:p14="http://schemas.microsoft.com/office/powerpoint/2010/main" Requires="p14">
+        <mc:AlternateContent xmlns:mc="http://schemas.openxmlformats.org/markup-compatibility/2006" xmlns:p14="http://schemas.microsoft.com/office/powerpoint/2010/main">
+          <mc:Choice Requires="p14">
             <p:contentPart p14:bwMode="auto" r:id="rId23">
               <p14:nvContentPartPr>
                 <p14:cNvPr id="18" name="Ink 17">
@@ -25708,7 +25702,7 @@
               </p14:xfrm>
             </p:contentPart>
           </mc:Choice>
-          <mc:Fallback>
+          <mc:Fallback xmlns="">
             <p:pic>
               <p:nvPicPr>
                 <p:cNvPr id="18" name="Ink 17">
@@ -25739,8 +25733,8 @@
             </p:pic>
           </mc:Fallback>
         </mc:AlternateContent>
-        <mc:AlternateContent xmlns:mc="http://schemas.openxmlformats.org/markup-compatibility/2006">
-          <mc:Choice xmlns:p14="http://schemas.microsoft.com/office/powerpoint/2010/main" Requires="p14">
+        <mc:AlternateContent xmlns:mc="http://schemas.openxmlformats.org/markup-compatibility/2006" xmlns:p14="http://schemas.microsoft.com/office/powerpoint/2010/main">
+          <mc:Choice Requires="p14">
             <p:contentPart p14:bwMode="auto" r:id="rId25">
               <p14:nvContentPartPr>
                 <p14:cNvPr id="19" name="Ink 18">
@@ -25759,7 +25753,7 @@
               </p14:xfrm>
             </p:contentPart>
           </mc:Choice>
-          <mc:Fallback>
+          <mc:Fallback xmlns="">
             <p:pic>
               <p:nvPicPr>
                 <p:cNvPr id="19" name="Ink 18">
@@ -25790,8 +25784,8 @@
             </p:pic>
           </mc:Fallback>
         </mc:AlternateContent>
-        <mc:AlternateContent xmlns:mc="http://schemas.openxmlformats.org/markup-compatibility/2006">
-          <mc:Choice xmlns:p14="http://schemas.microsoft.com/office/powerpoint/2010/main" Requires="p14">
+        <mc:AlternateContent xmlns:mc="http://schemas.openxmlformats.org/markup-compatibility/2006" xmlns:p14="http://schemas.microsoft.com/office/powerpoint/2010/main">
+          <mc:Choice Requires="p14">
             <p:contentPart p14:bwMode="auto" r:id="rId27">
               <p14:nvContentPartPr>
                 <p14:cNvPr id="20" name="Ink 19">
@@ -25810,7 +25804,7 @@
               </p14:xfrm>
             </p:contentPart>
           </mc:Choice>
-          <mc:Fallback>
+          <mc:Fallback xmlns="">
             <p:pic>
               <p:nvPicPr>
                 <p:cNvPr id="20" name="Ink 19">
@@ -25862,8 +25856,8 @@
             <a:chExt cx="2233080" cy="262800"/>
           </a:xfrm>
         </p:grpSpPr>
-        <mc:AlternateContent xmlns:mc="http://schemas.openxmlformats.org/markup-compatibility/2006">
-          <mc:Choice xmlns:p14="http://schemas.microsoft.com/office/powerpoint/2010/main" Requires="p14">
+        <mc:AlternateContent xmlns:mc="http://schemas.openxmlformats.org/markup-compatibility/2006" xmlns:p14="http://schemas.microsoft.com/office/powerpoint/2010/main">
+          <mc:Choice Requires="p14">
             <p:contentPart p14:bwMode="auto" r:id="rId29">
               <p14:nvContentPartPr>
                 <p14:cNvPr id="22" name="Ink 21">
@@ -25882,7 +25876,7 @@
               </p14:xfrm>
             </p:contentPart>
           </mc:Choice>
-          <mc:Fallback>
+          <mc:Fallback xmlns="">
             <p:pic>
               <p:nvPicPr>
                 <p:cNvPr id="22" name="Ink 21">
@@ -25913,8 +25907,8 @@
             </p:pic>
           </mc:Fallback>
         </mc:AlternateContent>
-        <mc:AlternateContent xmlns:mc="http://schemas.openxmlformats.org/markup-compatibility/2006">
-          <mc:Choice xmlns:p14="http://schemas.microsoft.com/office/powerpoint/2010/main" Requires="p14">
+        <mc:AlternateContent xmlns:mc="http://schemas.openxmlformats.org/markup-compatibility/2006" xmlns:p14="http://schemas.microsoft.com/office/powerpoint/2010/main">
+          <mc:Choice Requires="p14">
             <p:contentPart p14:bwMode="auto" r:id="rId31">
               <p14:nvContentPartPr>
                 <p14:cNvPr id="23" name="Ink 22">
@@ -25933,7 +25927,7 @@
               </p14:xfrm>
             </p:contentPart>
           </mc:Choice>
-          <mc:Fallback>
+          <mc:Fallback xmlns="">
             <p:pic>
               <p:nvPicPr>
                 <p:cNvPr id="23" name="Ink 22">
@@ -25964,8 +25958,8 @@
             </p:pic>
           </mc:Fallback>
         </mc:AlternateContent>
-        <mc:AlternateContent xmlns:mc="http://schemas.openxmlformats.org/markup-compatibility/2006">
-          <mc:Choice xmlns:p14="http://schemas.microsoft.com/office/powerpoint/2010/main" Requires="p14">
+        <mc:AlternateContent xmlns:mc="http://schemas.openxmlformats.org/markup-compatibility/2006" xmlns:p14="http://schemas.microsoft.com/office/powerpoint/2010/main">
+          <mc:Choice Requires="p14">
             <p:contentPart p14:bwMode="auto" r:id="rId33">
               <p14:nvContentPartPr>
                 <p14:cNvPr id="25" name="Ink 24">
@@ -25984,7 +25978,7 @@
               </p14:xfrm>
             </p:contentPart>
           </mc:Choice>
-          <mc:Fallback>
+          <mc:Fallback xmlns="">
             <p:pic>
               <p:nvPicPr>
                 <p:cNvPr id="25" name="Ink 24">
@@ -26036,8 +26030,8 @@
             <a:chExt cx="1454760" cy="246600"/>
           </a:xfrm>
         </p:grpSpPr>
-        <mc:AlternateContent xmlns:mc="http://schemas.openxmlformats.org/markup-compatibility/2006">
-          <mc:Choice xmlns:p14="http://schemas.microsoft.com/office/powerpoint/2010/main" Requires="p14">
+        <mc:AlternateContent xmlns:mc="http://schemas.openxmlformats.org/markup-compatibility/2006" xmlns:p14="http://schemas.microsoft.com/office/powerpoint/2010/main">
+          <mc:Choice Requires="p14">
             <p:contentPart p14:bwMode="auto" r:id="rId35">
               <p14:nvContentPartPr>
                 <p14:cNvPr id="29" name="Ink 28">
@@ -26056,7 +26050,7 @@
               </p14:xfrm>
             </p:contentPart>
           </mc:Choice>
-          <mc:Fallback>
+          <mc:Fallback xmlns="">
             <p:pic>
               <p:nvPicPr>
                 <p:cNvPr id="29" name="Ink 28">
@@ -26087,8 +26081,8 @@
             </p:pic>
           </mc:Fallback>
         </mc:AlternateContent>
-        <mc:AlternateContent xmlns:mc="http://schemas.openxmlformats.org/markup-compatibility/2006">
-          <mc:Choice xmlns:p14="http://schemas.microsoft.com/office/powerpoint/2010/main" Requires="p14">
+        <mc:AlternateContent xmlns:mc="http://schemas.openxmlformats.org/markup-compatibility/2006" xmlns:p14="http://schemas.microsoft.com/office/powerpoint/2010/main">
+          <mc:Choice Requires="p14">
             <p:contentPart p14:bwMode="auto" r:id="rId37">
               <p14:nvContentPartPr>
                 <p14:cNvPr id="30" name="Ink 29">
@@ -26107,7 +26101,7 @@
               </p14:xfrm>
             </p:contentPart>
           </mc:Choice>
-          <mc:Fallback>
+          <mc:Fallback xmlns="">
             <p:pic>
               <p:nvPicPr>
                 <p:cNvPr id="30" name="Ink 29">
@@ -26138,8 +26132,8 @@
             </p:pic>
           </mc:Fallback>
         </mc:AlternateContent>
-        <mc:AlternateContent xmlns:mc="http://schemas.openxmlformats.org/markup-compatibility/2006">
-          <mc:Choice xmlns:p14="http://schemas.microsoft.com/office/powerpoint/2010/main" Requires="p14">
+        <mc:AlternateContent xmlns:mc="http://schemas.openxmlformats.org/markup-compatibility/2006" xmlns:p14="http://schemas.microsoft.com/office/powerpoint/2010/main">
+          <mc:Choice Requires="p14">
             <p:contentPart p14:bwMode="auto" r:id="rId39">
               <p14:nvContentPartPr>
                 <p14:cNvPr id="34" name="Ink 33">
@@ -26158,7 +26152,7 @@
               </p14:xfrm>
             </p:contentPart>
           </mc:Choice>
-          <mc:Fallback>
+          <mc:Fallback xmlns="">
             <p:pic>
               <p:nvPicPr>
                 <p:cNvPr id="34" name="Ink 33">
@@ -26210,8 +26204,8 @@
             <a:chExt cx="1491120" cy="239760"/>
           </a:xfrm>
         </p:grpSpPr>
-        <mc:AlternateContent xmlns:mc="http://schemas.openxmlformats.org/markup-compatibility/2006">
-          <mc:Choice xmlns:p14="http://schemas.microsoft.com/office/powerpoint/2010/main" Requires="p14">
+        <mc:AlternateContent xmlns:mc="http://schemas.openxmlformats.org/markup-compatibility/2006" xmlns:p14="http://schemas.microsoft.com/office/powerpoint/2010/main">
+          <mc:Choice Requires="p14">
             <p:contentPart p14:bwMode="auto" r:id="rId41">
               <p14:nvContentPartPr>
                 <p14:cNvPr id="36" name="Ink 35">
@@ -26230,7 +26224,7 @@
               </p14:xfrm>
             </p:contentPart>
           </mc:Choice>
-          <mc:Fallback>
+          <mc:Fallback xmlns="">
             <p:pic>
               <p:nvPicPr>
                 <p:cNvPr id="36" name="Ink 35">
@@ -26261,8 +26255,8 @@
             </p:pic>
           </mc:Fallback>
         </mc:AlternateContent>
-        <mc:AlternateContent xmlns:mc="http://schemas.openxmlformats.org/markup-compatibility/2006">
-          <mc:Choice xmlns:p14="http://schemas.microsoft.com/office/powerpoint/2010/main" Requires="p14">
+        <mc:AlternateContent xmlns:mc="http://schemas.openxmlformats.org/markup-compatibility/2006" xmlns:p14="http://schemas.microsoft.com/office/powerpoint/2010/main">
+          <mc:Choice Requires="p14">
             <p:contentPart p14:bwMode="auto" r:id="rId43">
               <p14:nvContentPartPr>
                 <p14:cNvPr id="37" name="Ink 36">
@@ -26281,7 +26275,7 @@
               </p14:xfrm>
             </p:contentPart>
           </mc:Choice>
-          <mc:Fallback>
+          <mc:Fallback xmlns="">
             <p:pic>
               <p:nvPicPr>
                 <p:cNvPr id="37" name="Ink 36">
@@ -26333,8 +26327,8 @@
             <a:chExt cx="1060560" cy="249840"/>
           </a:xfrm>
         </p:grpSpPr>
-        <mc:AlternateContent xmlns:mc="http://schemas.openxmlformats.org/markup-compatibility/2006">
-          <mc:Choice xmlns:p14="http://schemas.microsoft.com/office/powerpoint/2010/main" Requires="p14">
+        <mc:AlternateContent xmlns:mc="http://schemas.openxmlformats.org/markup-compatibility/2006" xmlns:p14="http://schemas.microsoft.com/office/powerpoint/2010/main">
+          <mc:Choice Requires="p14">
             <p:contentPart p14:bwMode="auto" r:id="rId45">
               <p14:nvContentPartPr>
                 <p14:cNvPr id="39" name="Ink 38">
@@ -26353,7 +26347,7 @@
               </p14:xfrm>
             </p:contentPart>
           </mc:Choice>
-          <mc:Fallback>
+          <mc:Fallback xmlns="">
             <p:pic>
               <p:nvPicPr>
                 <p:cNvPr id="39" name="Ink 38">
@@ -26384,8 +26378,8 @@
             </p:pic>
           </mc:Fallback>
         </mc:AlternateContent>
-        <mc:AlternateContent xmlns:mc="http://schemas.openxmlformats.org/markup-compatibility/2006">
-          <mc:Choice xmlns:p14="http://schemas.microsoft.com/office/powerpoint/2010/main" Requires="p14">
+        <mc:AlternateContent xmlns:mc="http://schemas.openxmlformats.org/markup-compatibility/2006" xmlns:p14="http://schemas.microsoft.com/office/powerpoint/2010/main">
+          <mc:Choice Requires="p14">
             <p:contentPart p14:bwMode="auto" r:id="rId47">
               <p14:nvContentPartPr>
                 <p14:cNvPr id="40" name="Ink 39">
@@ -26404,7 +26398,7 @@
               </p14:xfrm>
             </p:contentPart>
           </mc:Choice>
-          <mc:Fallback>
+          <mc:Fallback xmlns="">
             <p:pic>
               <p:nvPicPr>
                 <p:cNvPr id="40" name="Ink 39">
@@ -26456,8 +26450,8 @@
             <a:chExt cx="452880" cy="201240"/>
           </a:xfrm>
         </p:grpSpPr>
-        <mc:AlternateContent xmlns:mc="http://schemas.openxmlformats.org/markup-compatibility/2006">
-          <mc:Choice xmlns:p14="http://schemas.microsoft.com/office/powerpoint/2010/main" Requires="p14">
+        <mc:AlternateContent xmlns:mc="http://schemas.openxmlformats.org/markup-compatibility/2006" xmlns:p14="http://schemas.microsoft.com/office/powerpoint/2010/main">
+          <mc:Choice Requires="p14">
             <p:contentPart p14:bwMode="auto" r:id="rId49">
               <p14:nvContentPartPr>
                 <p14:cNvPr id="42" name="Ink 41">
@@ -26476,7 +26470,7 @@
               </p14:xfrm>
             </p:contentPart>
           </mc:Choice>
-          <mc:Fallback>
+          <mc:Fallback xmlns="">
             <p:pic>
               <p:nvPicPr>
                 <p:cNvPr id="42" name="Ink 41">
@@ -26507,8 +26501,8 @@
             </p:pic>
           </mc:Fallback>
         </mc:AlternateContent>
-        <mc:AlternateContent xmlns:mc="http://schemas.openxmlformats.org/markup-compatibility/2006">
-          <mc:Choice xmlns:p14="http://schemas.microsoft.com/office/powerpoint/2010/main" Requires="p14">
+        <mc:AlternateContent xmlns:mc="http://schemas.openxmlformats.org/markup-compatibility/2006" xmlns:p14="http://schemas.microsoft.com/office/powerpoint/2010/main">
+          <mc:Choice Requires="p14">
             <p:contentPart p14:bwMode="auto" r:id="rId51">
               <p14:nvContentPartPr>
                 <p14:cNvPr id="43" name="Ink 42">
@@ -26527,7 +26521,7 @@
               </p14:xfrm>
             </p:contentPart>
           </mc:Choice>
-          <mc:Fallback>
+          <mc:Fallback xmlns="">
             <p:pic>
               <p:nvPicPr>
                 <p:cNvPr id="43" name="Ink 42">
@@ -26558,8 +26552,8 @@
             </p:pic>
           </mc:Fallback>
         </mc:AlternateContent>
-        <mc:AlternateContent xmlns:mc="http://schemas.openxmlformats.org/markup-compatibility/2006">
-          <mc:Choice xmlns:p14="http://schemas.microsoft.com/office/powerpoint/2010/main" Requires="p14">
+        <mc:AlternateContent xmlns:mc="http://schemas.openxmlformats.org/markup-compatibility/2006" xmlns:p14="http://schemas.microsoft.com/office/powerpoint/2010/main">
+          <mc:Choice Requires="p14">
             <p:contentPart p14:bwMode="auto" r:id="rId53">
               <p14:nvContentPartPr>
                 <p14:cNvPr id="45" name="Ink 44">
@@ -26578,7 +26572,7 @@
               </p14:xfrm>
             </p:contentPart>
           </mc:Choice>
-          <mc:Fallback>
+          <mc:Fallback xmlns="">
             <p:pic>
               <p:nvPicPr>
                 <p:cNvPr id="45" name="Ink 44">
@@ -26610,8 +26604,8 @@
           </mc:Fallback>
         </mc:AlternateContent>
       </p:grpSp>
-      <mc:AlternateContent xmlns:mc="http://schemas.openxmlformats.org/markup-compatibility/2006">
-        <mc:Choice xmlns:a14="http://schemas.microsoft.com/office/drawing/2010/main" Requires="a14">
+      <mc:AlternateContent xmlns:mc="http://schemas.openxmlformats.org/markup-compatibility/2006" xmlns:a14="http://schemas.microsoft.com/office/drawing/2010/main">
+        <mc:Choice Requires="a14">
           <p:sp>
             <p:nvSpPr>
               <p:cNvPr id="47" name="TextBox 46">
@@ -26677,7 +26671,7 @@
             </p:txBody>
           </p:sp>
         </mc:Choice>
-        <mc:Fallback>
+        <mc:Fallback xmlns="">
           <p:sp>
             <p:nvSpPr>
               <p:cNvPr id="47" name="TextBox 46">
@@ -26725,8 +26719,8 @@
           </p:sp>
         </mc:Fallback>
       </mc:AlternateContent>
-      <mc:AlternateContent xmlns:mc="http://schemas.openxmlformats.org/markup-compatibility/2006">
-        <mc:Choice xmlns:a14="http://schemas.microsoft.com/office/drawing/2010/main" Requires="a14">
+      <mc:AlternateContent xmlns:mc="http://schemas.openxmlformats.org/markup-compatibility/2006" xmlns:a14="http://schemas.microsoft.com/office/drawing/2010/main">
+        <mc:Choice Requires="a14">
           <p:sp>
             <p:nvSpPr>
               <p:cNvPr id="48" name="TextBox 47">
@@ -26798,7 +26792,7 @@
             </p:txBody>
           </p:sp>
         </mc:Choice>
-        <mc:Fallback>
+        <mc:Fallback xmlns="">
           <p:sp>
             <p:nvSpPr>
               <p:cNvPr id="48" name="TextBox 47">
@@ -26846,8 +26840,8 @@
           </p:sp>
         </mc:Fallback>
       </mc:AlternateContent>
-      <mc:AlternateContent xmlns:mc="http://schemas.openxmlformats.org/markup-compatibility/2006">
-        <mc:Choice xmlns:a14="http://schemas.microsoft.com/office/drawing/2010/main" Requires="a14">
+      <mc:AlternateContent xmlns:mc="http://schemas.openxmlformats.org/markup-compatibility/2006" xmlns:a14="http://schemas.microsoft.com/office/drawing/2010/main">
+        <mc:Choice Requires="a14">
           <p:sp>
             <p:nvSpPr>
               <p:cNvPr id="49" name="TextBox 48">
@@ -26919,7 +26913,7 @@
             </p:txBody>
           </p:sp>
         </mc:Choice>
-        <mc:Fallback>
+        <mc:Fallback xmlns="">
           <p:sp>
             <p:nvSpPr>
               <p:cNvPr id="49" name="TextBox 48">
@@ -26967,8 +26961,8 @@
           </p:sp>
         </mc:Fallback>
       </mc:AlternateContent>
-      <mc:AlternateContent xmlns:mc="http://schemas.openxmlformats.org/markup-compatibility/2006">
-        <mc:Choice xmlns:a14="http://schemas.microsoft.com/office/drawing/2010/main" Requires="a14">
+      <mc:AlternateContent xmlns:mc="http://schemas.openxmlformats.org/markup-compatibility/2006" xmlns:a14="http://schemas.microsoft.com/office/drawing/2010/main">
+        <mc:Choice Requires="a14">
           <p:sp>
             <p:nvSpPr>
               <p:cNvPr id="50" name="TextBox 49">
@@ -27040,7 +27034,7 @@
             </p:txBody>
           </p:sp>
         </mc:Choice>
-        <mc:Fallback>
+        <mc:Fallback xmlns="">
           <p:sp>
             <p:nvSpPr>
               <p:cNvPr id="50" name="TextBox 49">
@@ -27088,8 +27082,8 @@
           </p:sp>
         </mc:Fallback>
       </mc:AlternateContent>
-      <mc:AlternateContent xmlns:mc="http://schemas.openxmlformats.org/markup-compatibility/2006">
-        <mc:Choice xmlns:a14="http://schemas.microsoft.com/office/drawing/2010/main" Requires="a14">
+      <mc:AlternateContent xmlns:mc="http://schemas.openxmlformats.org/markup-compatibility/2006" xmlns:a14="http://schemas.microsoft.com/office/drawing/2010/main">
+        <mc:Choice Requires="a14">
           <p:sp>
             <p:nvSpPr>
               <p:cNvPr id="51" name="TextBox 50">
@@ -27155,7 +27149,7 @@
             </p:txBody>
           </p:sp>
         </mc:Choice>
-        <mc:Fallback>
+        <mc:Fallback xmlns="">
           <p:sp>
             <p:nvSpPr>
               <p:cNvPr id="51" name="TextBox 50">
@@ -27203,8 +27197,8 @@
           </p:sp>
         </mc:Fallback>
       </mc:AlternateContent>
-      <mc:AlternateContent xmlns:mc="http://schemas.openxmlformats.org/markup-compatibility/2006">
-        <mc:Choice xmlns:a14="http://schemas.microsoft.com/office/drawing/2010/main" Requires="a14">
+      <mc:AlternateContent xmlns:mc="http://schemas.openxmlformats.org/markup-compatibility/2006" xmlns:a14="http://schemas.microsoft.com/office/drawing/2010/main">
+        <mc:Choice Requires="a14">
           <p:sp>
             <p:nvSpPr>
               <p:cNvPr id="52" name="TextBox 51">
@@ -27270,7 +27264,7 @@
             </p:txBody>
           </p:sp>
         </mc:Choice>
-        <mc:Fallback>
+        <mc:Fallback xmlns="">
           <p:sp>
             <p:nvSpPr>
               <p:cNvPr id="52" name="TextBox 51">
@@ -27318,8 +27312,8 @@
           </p:sp>
         </mc:Fallback>
       </mc:AlternateContent>
-      <mc:AlternateContent xmlns:mc="http://schemas.openxmlformats.org/markup-compatibility/2006">
-        <mc:Choice xmlns:a14="http://schemas.microsoft.com/office/drawing/2010/main" Requires="a14">
+      <mc:AlternateContent xmlns:mc="http://schemas.openxmlformats.org/markup-compatibility/2006" xmlns:a14="http://schemas.microsoft.com/office/drawing/2010/main">
+        <mc:Choice Requires="a14">
           <p:sp>
             <p:nvSpPr>
               <p:cNvPr id="53" name="TextBox 52">
@@ -27385,7 +27379,7 @@
             </p:txBody>
           </p:sp>
         </mc:Choice>
-        <mc:Fallback>
+        <mc:Fallback xmlns="">
           <p:sp>
             <p:nvSpPr>
               <p:cNvPr id="53" name="TextBox 52">
@@ -27589,10 +27583,16 @@
                                 <m:t>𝑛</m:t>
                               </m:r>
                               <m:r>
+                                <a:rPr lang="en-GB" b="0" i="1" dirty="0" smtClean="0">
+                                  <a:latin typeface="Cambria Math" panose="02040503050406030204" pitchFamily="18" charset="0"/>
+                                </a:rPr>
+                                <m:t>+</m:t>
+                              </m:r>
+                              <m:r>
                                 <a:rPr lang="en-GB" i="1" dirty="0">
                                   <a:latin typeface="Cambria Math" panose="02040503050406030204" pitchFamily="18" charset="0"/>
                                 </a:rPr>
-                                <m:t>−1</m:t>
+                                <m:t>1</m:t>
                               </m:r>
                             </m:e>
                           </m:d>
@@ -27672,8 +27672,8 @@
           </p:sp>
         </mc:Fallback>
       </mc:AlternateContent>
-      <mc:AlternateContent xmlns:mc="http://schemas.openxmlformats.org/markup-compatibility/2006">
-        <mc:Choice xmlns:a14="http://schemas.microsoft.com/office/drawing/2010/main" Requires="a14">
+      <mc:AlternateContent xmlns:mc="http://schemas.openxmlformats.org/markup-compatibility/2006" xmlns:a14="http://schemas.microsoft.com/office/drawing/2010/main">
+        <mc:Choice Requires="a14">
           <p:sp>
             <p:nvSpPr>
               <p:cNvPr id="57" name="TextBox 56">
@@ -27779,7 +27779,7 @@
             </p:txBody>
           </p:sp>
         </mc:Choice>
-        <mc:Fallback>
+        <mc:Fallback xmlns="">
           <p:sp>
             <p:nvSpPr>
               <p:cNvPr id="57" name="TextBox 56">
@@ -27947,10 +27947,16 @@
                                 <m:t>𝑛</m:t>
                               </m:r>
                               <m:r>
+                                <a:rPr lang="en-GB" sz="1600" b="0" i="1" dirty="0" smtClean="0">
+                                  <a:latin typeface="Cambria Math" panose="02040503050406030204" pitchFamily="18" charset="0"/>
+                                </a:rPr>
+                                <m:t>+</m:t>
+                              </m:r>
+                              <m:r>
                                 <a:rPr lang="en-GB" sz="1600" i="1" dirty="0">
                                   <a:latin typeface="Cambria Math" panose="02040503050406030204" pitchFamily="18" charset="0"/>
                                 </a:rPr>
-                                <m:t>−1</m:t>
+                                <m:t>1</m:t>
                               </m:r>
                             </m:e>
                           </m:d>
@@ -28023,8 +28029,8 @@
           </p:sp>
         </mc:Fallback>
       </mc:AlternateContent>
-      <mc:AlternateContent xmlns:mc="http://schemas.openxmlformats.org/markup-compatibility/2006">
-        <mc:Choice xmlns:p14="http://schemas.microsoft.com/office/powerpoint/2010/main" Requires="p14">
+      <mc:AlternateContent xmlns:mc="http://schemas.openxmlformats.org/markup-compatibility/2006" xmlns:p14="http://schemas.microsoft.com/office/powerpoint/2010/main">
+        <mc:Choice Requires="p14">
           <p:contentPart p14:bwMode="auto" r:id="rId65">
             <p14:nvContentPartPr>
               <p14:cNvPr id="60" name="Ink 59">
@@ -28043,7 +28049,7 @@
             </p14:xfrm>
           </p:contentPart>
         </mc:Choice>
-        <mc:Fallback>
+        <mc:Fallback xmlns="">
           <p:pic>
             <p:nvPicPr>
               <p:cNvPr id="60" name="Ink 59">
@@ -29308,8 +29314,8 @@
           </a:p>
         </p:txBody>
       </p:sp>
-      <mc:AlternateContent xmlns:mc="http://schemas.openxmlformats.org/markup-compatibility/2006">
-        <mc:Choice xmlns:a14="http://schemas.microsoft.com/office/drawing/2010/main" Requires="a14">
+      <mc:AlternateContent xmlns:mc="http://schemas.openxmlformats.org/markup-compatibility/2006" xmlns:a14="http://schemas.microsoft.com/office/drawing/2010/main">
+        <mc:Choice Requires="a14">
           <p:sp>
             <p:nvSpPr>
               <p:cNvPr id="11" name="TextBox 10">
@@ -29418,7 +29424,7 @@
             </p:txBody>
           </p:sp>
         </mc:Choice>
-        <mc:Fallback>
+        <mc:Fallback xmlns="">
           <p:sp>
             <p:nvSpPr>
               <p:cNvPr id="11" name="TextBox 10">
@@ -29464,8 +29470,8 @@
           </p:sp>
         </mc:Fallback>
       </mc:AlternateContent>
-      <mc:AlternateContent xmlns:mc="http://schemas.openxmlformats.org/markup-compatibility/2006">
-        <mc:Choice xmlns:a14="http://schemas.microsoft.com/office/drawing/2010/main" Requires="a14">
+      <mc:AlternateContent xmlns:mc="http://schemas.openxmlformats.org/markup-compatibility/2006" xmlns:a14="http://schemas.microsoft.com/office/drawing/2010/main">
+        <mc:Choice Requires="a14">
           <p:sp>
             <p:nvSpPr>
               <p:cNvPr id="12" name="TextBox 11">
@@ -29605,7 +29611,7 @@
             </p:txBody>
           </p:sp>
         </mc:Choice>
-        <mc:Fallback>
+        <mc:Fallback xmlns="">
           <p:sp>
             <p:nvSpPr>
               <p:cNvPr id="12" name="TextBox 11">
@@ -29651,8 +29657,8 @@
           </p:sp>
         </mc:Fallback>
       </mc:AlternateContent>
-      <mc:AlternateContent xmlns:mc="http://schemas.openxmlformats.org/markup-compatibility/2006">
-        <mc:Choice xmlns:a14="http://schemas.microsoft.com/office/drawing/2010/main" Requires="a14">
+      <mc:AlternateContent xmlns:mc="http://schemas.openxmlformats.org/markup-compatibility/2006" xmlns:a14="http://schemas.microsoft.com/office/drawing/2010/main">
+        <mc:Choice Requires="a14">
           <p:sp>
             <p:nvSpPr>
               <p:cNvPr id="4" name="TextBox 3">
@@ -29760,13 +29766,7 @@
                           <a:rPr lang="en-GB" sz="2700" b="0" i="1" dirty="0" smtClean="0">
                             <a:latin typeface="Cambria Math" panose="02040503050406030204" pitchFamily="18" charset="0"/>
                           </a:rPr>
-                          <m:t>−</m:t>
-                        </m:r>
-                        <m:r>
-                          <a:rPr lang="en-GB" sz="2700" b="0" i="1" dirty="0" smtClean="0">
-                            <a:latin typeface="Cambria Math" panose="02040503050406030204" pitchFamily="18" charset="0"/>
-                          </a:rPr>
-                          <m:t>1−1</m:t>
+                          <m:t>−1−1</m:t>
                         </m:r>
                       </m:e>
                     </m:d>
@@ -29798,7 +29798,7 @@
             </p:txBody>
           </p:sp>
         </mc:Choice>
-        <mc:Fallback>
+        <mc:Fallback xmlns="">
           <p:sp>
             <p:nvSpPr>
               <p:cNvPr id="4" name="TextBox 3">
@@ -29891,8 +29891,8 @@
           </a:p>
         </p:txBody>
       </p:sp>
-      <mc:AlternateContent xmlns:mc="http://schemas.openxmlformats.org/markup-compatibility/2006">
-        <mc:Choice xmlns:a14="http://schemas.microsoft.com/office/drawing/2010/main" Requires="a14">
+      <mc:AlternateContent xmlns:mc="http://schemas.openxmlformats.org/markup-compatibility/2006" xmlns:a14="http://schemas.microsoft.com/office/drawing/2010/main">
+        <mc:Choice Requires="a14">
           <p:sp>
             <p:nvSpPr>
               <p:cNvPr id="19" name="TextBox 18">
@@ -30008,7 +30008,7 @@
             </p:txBody>
           </p:sp>
         </mc:Choice>
-        <mc:Fallback>
+        <mc:Fallback xmlns="">
           <p:sp>
             <p:nvSpPr>
               <p:cNvPr id="19" name="TextBox 18">
@@ -30053,8 +30053,8 @@
           </p:sp>
         </mc:Fallback>
       </mc:AlternateContent>
-      <mc:AlternateContent xmlns:mc="http://schemas.openxmlformats.org/markup-compatibility/2006">
-        <mc:Choice xmlns:a14="http://schemas.microsoft.com/office/drawing/2010/main" Requires="a14">
+      <mc:AlternateContent xmlns:mc="http://schemas.openxmlformats.org/markup-compatibility/2006" xmlns:a14="http://schemas.microsoft.com/office/drawing/2010/main">
+        <mc:Choice Requires="a14">
           <p:sp>
             <p:nvSpPr>
               <p:cNvPr id="2" name="TextBox 1">
@@ -30262,7 +30262,7 @@
             </p:txBody>
           </p:sp>
         </mc:Choice>
-        <mc:Fallback>
+        <mc:Fallback xmlns="">
           <p:sp>
             <p:nvSpPr>
               <p:cNvPr id="2" name="TextBox 1">
@@ -30559,8 +30559,8 @@
           </a:p>
         </p:txBody>
       </p:sp>
-      <mc:AlternateContent xmlns:mc="http://schemas.openxmlformats.org/markup-compatibility/2006">
-        <mc:Choice xmlns:a14="http://schemas.microsoft.com/office/drawing/2010/main" Requires="a14">
+      <mc:AlternateContent xmlns:mc="http://schemas.openxmlformats.org/markup-compatibility/2006" xmlns:a14="http://schemas.microsoft.com/office/drawing/2010/main">
+        <mc:Choice Requires="a14">
           <p:sp>
             <p:nvSpPr>
               <p:cNvPr id="5" name="TextBox 4">
@@ -30633,7 +30633,7 @@
             </p:txBody>
           </p:sp>
         </mc:Choice>
-        <mc:Fallback>
+        <mc:Fallback xmlns="">
           <p:sp>
             <p:nvSpPr>
               <p:cNvPr id="5" name="TextBox 4">
@@ -30678,8 +30678,8 @@
           </p:sp>
         </mc:Fallback>
       </mc:AlternateContent>
-      <mc:AlternateContent xmlns:mc="http://schemas.openxmlformats.org/markup-compatibility/2006">
-        <mc:Choice xmlns:a14="http://schemas.microsoft.com/office/drawing/2010/main" Requires="a14">
+      <mc:AlternateContent xmlns:mc="http://schemas.openxmlformats.org/markup-compatibility/2006" xmlns:a14="http://schemas.microsoft.com/office/drawing/2010/main">
+        <mc:Choice Requires="a14">
           <p:sp>
             <p:nvSpPr>
               <p:cNvPr id="6" name="TextBox 5">
@@ -30830,7 +30830,7 @@
             </p:txBody>
           </p:sp>
         </mc:Choice>
-        <mc:Fallback>
+        <mc:Fallback xmlns="">
           <p:sp>
             <p:nvSpPr>
               <p:cNvPr id="6" name="TextBox 5">
@@ -30875,8 +30875,8 @@
           </p:sp>
         </mc:Fallback>
       </mc:AlternateContent>
-      <mc:AlternateContent xmlns:mc="http://schemas.openxmlformats.org/markup-compatibility/2006">
-        <mc:Choice xmlns:a14="http://schemas.microsoft.com/office/drawing/2010/main" Requires="a14">
+      <mc:AlternateContent xmlns:mc="http://schemas.openxmlformats.org/markup-compatibility/2006" xmlns:a14="http://schemas.microsoft.com/office/drawing/2010/main">
+        <mc:Choice Requires="a14">
           <p:sp>
             <p:nvSpPr>
               <p:cNvPr id="11" name="TextBox 10">
@@ -31002,7 +31002,7 @@
             </p:txBody>
           </p:sp>
         </mc:Choice>
-        <mc:Fallback>
+        <mc:Fallback xmlns="">
           <p:sp>
             <p:nvSpPr>
               <p:cNvPr id="11" name="TextBox 10">
@@ -31048,8 +31048,8 @@
           </p:sp>
         </mc:Fallback>
       </mc:AlternateContent>
-      <mc:AlternateContent xmlns:mc="http://schemas.openxmlformats.org/markup-compatibility/2006">
-        <mc:Choice xmlns:a14="http://schemas.microsoft.com/office/drawing/2010/main" Requires="a14">
+      <mc:AlternateContent xmlns:mc="http://schemas.openxmlformats.org/markup-compatibility/2006" xmlns:a14="http://schemas.microsoft.com/office/drawing/2010/main">
+        <mc:Choice Requires="a14">
           <p:sp>
             <p:nvSpPr>
               <p:cNvPr id="12" name="TextBox 11">
@@ -31187,7 +31187,7 @@
             </p:txBody>
           </p:sp>
         </mc:Choice>
-        <mc:Fallback>
+        <mc:Fallback xmlns="">
           <p:sp>
             <p:nvSpPr>
               <p:cNvPr id="12" name="TextBox 11">
@@ -31233,8 +31233,8 @@
           </p:sp>
         </mc:Fallback>
       </mc:AlternateContent>
-      <mc:AlternateContent xmlns:mc="http://schemas.openxmlformats.org/markup-compatibility/2006">
-        <mc:Choice xmlns:a14="http://schemas.microsoft.com/office/drawing/2010/main" Requires="a14">
+      <mc:AlternateContent xmlns:mc="http://schemas.openxmlformats.org/markup-compatibility/2006" xmlns:a14="http://schemas.microsoft.com/office/drawing/2010/main">
+        <mc:Choice Requires="a14">
           <p:sp>
             <p:nvSpPr>
               <p:cNvPr id="14" name="TextBox 13">
@@ -31388,7 +31388,7 @@
             </p:txBody>
           </p:sp>
         </mc:Choice>
-        <mc:Fallback>
+        <mc:Fallback xmlns="">
           <p:sp>
             <p:nvSpPr>
               <p:cNvPr id="14" name="TextBox 13">
@@ -31438,8 +31438,8 @@
           </p:sp>
         </mc:Fallback>
       </mc:AlternateContent>
-      <mc:AlternateContent xmlns:mc="http://schemas.openxmlformats.org/markup-compatibility/2006">
-        <mc:Choice xmlns:a14="http://schemas.microsoft.com/office/drawing/2010/main" Requires="a14">
+      <mc:AlternateContent xmlns:mc="http://schemas.openxmlformats.org/markup-compatibility/2006" xmlns:a14="http://schemas.microsoft.com/office/drawing/2010/main">
+        <mc:Choice Requires="a14">
           <p:sp>
             <p:nvSpPr>
               <p:cNvPr id="26" name="TextBox 25">
@@ -31512,7 +31512,7 @@
             </p:txBody>
           </p:sp>
         </mc:Choice>
-        <mc:Fallback>
+        <mc:Fallback xmlns="">
           <p:sp>
             <p:nvSpPr>
               <p:cNvPr id="26" name="TextBox 25">
@@ -31557,8 +31557,8 @@
           </p:sp>
         </mc:Fallback>
       </mc:AlternateContent>
-      <mc:AlternateContent xmlns:mc="http://schemas.openxmlformats.org/markup-compatibility/2006">
-        <mc:Choice xmlns:p14="http://schemas.microsoft.com/office/powerpoint/2010/main" Requires="p14">
+      <mc:AlternateContent xmlns:mc="http://schemas.openxmlformats.org/markup-compatibility/2006" xmlns:p14="http://schemas.microsoft.com/office/powerpoint/2010/main">
+        <mc:Choice Requires="p14">
           <p:contentPart p14:bwMode="auto" r:id="rId10">
             <p14:nvContentPartPr>
               <p14:cNvPr id="28" name="Ink 27">
@@ -31577,7 +31577,7 @@
             </p14:xfrm>
           </p:contentPart>
         </mc:Choice>
-        <mc:Fallback>
+        <mc:Fallback xmlns="">
           <p:pic>
             <p:nvPicPr>
               <p:cNvPr id="28" name="Ink 27">
@@ -31628,8 +31628,8 @@
             <a:chExt cx="3952800" cy="266760"/>
           </a:xfrm>
         </p:grpSpPr>
-        <mc:AlternateContent xmlns:mc="http://schemas.openxmlformats.org/markup-compatibility/2006">
-          <mc:Choice xmlns:p14="http://schemas.microsoft.com/office/powerpoint/2010/main" Requires="p14">
+        <mc:AlternateContent xmlns:mc="http://schemas.openxmlformats.org/markup-compatibility/2006" xmlns:p14="http://schemas.microsoft.com/office/powerpoint/2010/main">
+          <mc:Choice Requires="p14">
             <p:contentPart p14:bwMode="auto" r:id="rId12">
               <p14:nvContentPartPr>
                 <p14:cNvPr id="32" name="Ink 31">
@@ -31648,7 +31648,7 @@
               </p14:xfrm>
             </p:contentPart>
           </mc:Choice>
-          <mc:Fallback>
+          <mc:Fallback xmlns="">
             <p:pic>
               <p:nvPicPr>
                 <p:cNvPr id="32" name="Ink 31">
@@ -31679,8 +31679,8 @@
             </p:pic>
           </mc:Fallback>
         </mc:AlternateContent>
-        <mc:AlternateContent xmlns:mc="http://schemas.openxmlformats.org/markup-compatibility/2006">
-          <mc:Choice xmlns:p14="http://schemas.microsoft.com/office/powerpoint/2010/main" Requires="p14">
+        <mc:AlternateContent xmlns:mc="http://schemas.openxmlformats.org/markup-compatibility/2006" xmlns:p14="http://schemas.microsoft.com/office/powerpoint/2010/main">
+          <mc:Choice Requires="p14">
             <p:contentPart p14:bwMode="auto" r:id="rId14">
               <p14:nvContentPartPr>
                 <p14:cNvPr id="33" name="Ink 32">
@@ -31699,7 +31699,7 @@
               </p14:xfrm>
             </p:contentPart>
           </mc:Choice>
-          <mc:Fallback>
+          <mc:Fallback xmlns="">
             <p:pic>
               <p:nvPicPr>
                 <p:cNvPr id="33" name="Ink 32">
@@ -31730,8 +31730,8 @@
             </p:pic>
           </mc:Fallback>
         </mc:AlternateContent>
-        <mc:AlternateContent xmlns:mc="http://schemas.openxmlformats.org/markup-compatibility/2006">
-          <mc:Choice xmlns:p14="http://schemas.microsoft.com/office/powerpoint/2010/main" Requires="p14">
+        <mc:AlternateContent xmlns:mc="http://schemas.openxmlformats.org/markup-compatibility/2006" xmlns:p14="http://schemas.microsoft.com/office/powerpoint/2010/main">
+          <mc:Choice Requires="p14">
             <p:contentPart p14:bwMode="auto" r:id="rId16">
               <p14:nvContentPartPr>
                 <p14:cNvPr id="36" name="Ink 35">
@@ -31750,7 +31750,7 @@
               </p14:xfrm>
             </p:contentPart>
           </mc:Choice>
-          <mc:Fallback>
+          <mc:Fallback xmlns="">
             <p:pic>
               <p:nvPicPr>
                 <p:cNvPr id="36" name="Ink 35">
@@ -31827,8 +31827,8 @@
           </a:p>
         </p:txBody>
       </p:sp>
-      <mc:AlternateContent xmlns:mc="http://schemas.openxmlformats.org/markup-compatibility/2006">
-        <mc:Choice xmlns:a14="http://schemas.microsoft.com/office/drawing/2010/main" Requires="a14">
+      <mc:AlternateContent xmlns:mc="http://schemas.openxmlformats.org/markup-compatibility/2006" xmlns:a14="http://schemas.microsoft.com/office/drawing/2010/main">
+        <mc:Choice Requires="a14">
           <p:sp>
             <p:nvSpPr>
               <p:cNvPr id="2" name="TextBox 1">
@@ -31990,7 +31990,7 @@
             </p:txBody>
           </p:sp>
         </mc:Choice>
-        <mc:Fallback>
+        <mc:Fallback xmlns="">
           <p:sp>
             <p:nvSpPr>
               <p:cNvPr id="2" name="TextBox 1">
@@ -32040,8 +32040,8 @@
           </p:sp>
         </mc:Fallback>
       </mc:AlternateContent>
-      <mc:AlternateContent xmlns:mc="http://schemas.openxmlformats.org/markup-compatibility/2006">
-        <mc:Choice xmlns:a14="http://schemas.microsoft.com/office/drawing/2010/main" Requires="a14">
+      <mc:AlternateContent xmlns:mc="http://schemas.openxmlformats.org/markup-compatibility/2006" xmlns:a14="http://schemas.microsoft.com/office/drawing/2010/main">
+        <mc:Choice Requires="a14">
           <p:sp>
             <p:nvSpPr>
               <p:cNvPr id="4" name="TextBox 3">
@@ -32179,7 +32179,7 @@
             </p:txBody>
           </p:sp>
         </mc:Choice>
-        <mc:Fallback>
+        <mc:Fallback xmlns="">
           <p:sp>
             <p:nvSpPr>
               <p:cNvPr id="4" name="TextBox 3">
@@ -32225,8 +32225,8 @@
           </p:sp>
         </mc:Fallback>
       </mc:AlternateContent>
-      <mc:AlternateContent xmlns:mc="http://schemas.openxmlformats.org/markup-compatibility/2006">
-        <mc:Choice xmlns:a14="http://schemas.microsoft.com/office/drawing/2010/main" Requires="a14">
+      <mc:AlternateContent xmlns:mc="http://schemas.openxmlformats.org/markup-compatibility/2006" xmlns:a14="http://schemas.microsoft.com/office/drawing/2010/main">
+        <mc:Choice Requires="a14">
           <p:sp>
             <p:nvSpPr>
               <p:cNvPr id="8" name="TextBox 7">
@@ -32364,7 +32364,7 @@
             </p:txBody>
           </p:sp>
         </mc:Choice>
-        <mc:Fallback>
+        <mc:Fallback xmlns="">
           <p:sp>
             <p:nvSpPr>
               <p:cNvPr id="8" name="TextBox 7">
@@ -32409,8 +32409,8 @@
           </p:sp>
         </mc:Fallback>
       </mc:AlternateContent>
-      <mc:AlternateContent xmlns:mc="http://schemas.openxmlformats.org/markup-compatibility/2006">
-        <mc:Choice xmlns:a14="http://schemas.microsoft.com/office/drawing/2010/main" Requires="a14">
+      <mc:AlternateContent xmlns:mc="http://schemas.openxmlformats.org/markup-compatibility/2006" xmlns:a14="http://schemas.microsoft.com/office/drawing/2010/main">
+        <mc:Choice Requires="a14">
           <p:sp>
             <p:nvSpPr>
               <p:cNvPr id="9" name="TextBox 8">
@@ -32553,7 +32553,7 @@
             </p:txBody>
           </p:sp>
         </mc:Choice>
-        <mc:Fallback>
+        <mc:Fallback xmlns="">
           <p:sp>
             <p:nvSpPr>
               <p:cNvPr id="9" name="TextBox 8">
@@ -32603,8 +32603,8 @@
           </p:sp>
         </mc:Fallback>
       </mc:AlternateContent>
-      <mc:AlternateContent xmlns:mc="http://schemas.openxmlformats.org/markup-compatibility/2006">
-        <mc:Choice xmlns:p14="http://schemas.microsoft.com/office/powerpoint/2010/main" Requires="p14">
+      <mc:AlternateContent xmlns:mc="http://schemas.openxmlformats.org/markup-compatibility/2006" xmlns:p14="http://schemas.microsoft.com/office/powerpoint/2010/main">
+        <mc:Choice Requires="p14">
           <p:contentPart p14:bwMode="auto" r:id="rId22">
             <p14:nvContentPartPr>
               <p14:cNvPr id="19" name="Ink 18">
@@ -32623,7 +32623,7 @@
             </p14:xfrm>
           </p:contentPart>
         </mc:Choice>
-        <mc:Fallback>
+        <mc:Fallback xmlns="">
           <p:pic>
             <p:nvPicPr>
               <p:cNvPr id="19" name="Ink 18">
@@ -32674,8 +32674,8 @@
             <a:chExt cx="4029840" cy="616680"/>
           </a:xfrm>
         </p:grpSpPr>
-        <mc:AlternateContent xmlns:mc="http://schemas.openxmlformats.org/markup-compatibility/2006">
-          <mc:Choice xmlns:p14="http://schemas.microsoft.com/office/powerpoint/2010/main" Requires="p14">
+        <mc:AlternateContent xmlns:mc="http://schemas.openxmlformats.org/markup-compatibility/2006" xmlns:p14="http://schemas.microsoft.com/office/powerpoint/2010/main">
+          <mc:Choice Requires="p14">
             <p:contentPart p14:bwMode="auto" r:id="rId24">
               <p14:nvContentPartPr>
                 <p14:cNvPr id="20" name="Ink 19">
@@ -32694,7 +32694,7 @@
               </p14:xfrm>
             </p:contentPart>
           </mc:Choice>
-          <mc:Fallback>
+          <mc:Fallback xmlns="">
             <p:pic>
               <p:nvPicPr>
                 <p:cNvPr id="20" name="Ink 19">
@@ -32725,8 +32725,8 @@
             </p:pic>
           </mc:Fallback>
         </mc:AlternateContent>
-        <mc:AlternateContent xmlns:mc="http://schemas.openxmlformats.org/markup-compatibility/2006">
-          <mc:Choice xmlns:p14="http://schemas.microsoft.com/office/powerpoint/2010/main" Requires="p14">
+        <mc:AlternateContent xmlns:mc="http://schemas.openxmlformats.org/markup-compatibility/2006" xmlns:p14="http://schemas.microsoft.com/office/powerpoint/2010/main">
+          <mc:Choice Requires="p14">
             <p:contentPart p14:bwMode="auto" r:id="rId26">
               <p14:nvContentPartPr>
                 <p14:cNvPr id="21" name="Ink 20">
@@ -32745,7 +32745,7 @@
               </p14:xfrm>
             </p:contentPart>
           </mc:Choice>
-          <mc:Fallback>
+          <mc:Fallback xmlns="">
             <p:pic>
               <p:nvPicPr>
                 <p:cNvPr id="21" name="Ink 20">
@@ -32777,8 +32777,8 @@
           </mc:Fallback>
         </mc:AlternateContent>
       </p:grpSp>
-      <mc:AlternateContent xmlns:mc="http://schemas.openxmlformats.org/markup-compatibility/2006">
-        <mc:Choice xmlns:a14="http://schemas.microsoft.com/office/drawing/2010/main" Requires="a14">
+      <mc:AlternateContent xmlns:mc="http://schemas.openxmlformats.org/markup-compatibility/2006" xmlns:a14="http://schemas.microsoft.com/office/drawing/2010/main">
+        <mc:Choice Requires="a14">
           <p:sp>
             <p:nvSpPr>
               <p:cNvPr id="23" name="TextBox 22">
@@ -32951,7 +32951,7 @@
             </p:txBody>
           </p:sp>
         </mc:Choice>
-        <mc:Fallback>
+        <mc:Fallback xmlns="">
           <p:sp>
             <p:nvSpPr>
               <p:cNvPr id="23" name="TextBox 22">
@@ -33001,8 +33001,8 @@
           </p:sp>
         </mc:Fallback>
       </mc:AlternateContent>
-      <mc:AlternateContent xmlns:mc="http://schemas.openxmlformats.org/markup-compatibility/2006">
-        <mc:Choice xmlns:a14="http://schemas.microsoft.com/office/drawing/2010/main" Requires="a14">
+      <mc:AlternateContent xmlns:mc="http://schemas.openxmlformats.org/markup-compatibility/2006" xmlns:a14="http://schemas.microsoft.com/office/drawing/2010/main">
+        <mc:Choice Requires="a14">
           <p:sp>
             <p:nvSpPr>
               <p:cNvPr id="24" name="TextBox 23">
@@ -33057,7 +33057,7 @@
             </p:txBody>
           </p:sp>
         </mc:Choice>
-        <mc:Fallback>
+        <mc:Fallback xmlns="">
           <p:sp>
             <p:nvSpPr>
               <p:cNvPr id="24" name="TextBox 23">
@@ -33821,12 +33821,12 @@
     <p:bldLst>
       <p:bldP spid="5" grpId="0"/>
       <p:bldP spid="6" grpId="0"/>
-      <p:bldP spid="14" grpId="0"/>
+      <p:bldP spid="14" grpId="0" animBg="1"/>
       <p:bldP spid="26" grpId="0"/>
-      <p:bldP spid="2" grpId="0"/>
+      <p:bldP spid="2" grpId="0" animBg="1"/>
       <p:bldP spid="8" grpId="0"/>
-      <p:bldP spid="9" grpId="0"/>
-      <p:bldP spid="23" grpId="0"/>
+      <p:bldP spid="9" grpId="0" animBg="1"/>
+      <p:bldP spid="23" grpId="0" animBg="1"/>
       <p:bldP spid="24" grpId="0"/>
     </p:bldLst>
   </p:timing>
@@ -33865,8 +33865,8 @@
           <a:chExt cx="0" cy="0"/>
         </a:xfrm>
       </p:grpSpPr>
-      <mc:AlternateContent xmlns:mc="http://schemas.openxmlformats.org/markup-compatibility/2006">
-        <mc:Choice xmlns:a14="http://schemas.microsoft.com/office/drawing/2010/main" Requires="a14">
+      <mc:AlternateContent xmlns:mc="http://schemas.openxmlformats.org/markup-compatibility/2006" xmlns:a14="http://schemas.microsoft.com/office/drawing/2010/main">
+        <mc:Choice Requires="a14">
           <p:sp>
             <p:nvSpPr>
               <p:cNvPr id="2" name="TextBox 1">
@@ -34074,7 +34074,7 @@
             </p:txBody>
           </p:sp>
         </mc:Choice>
-        <mc:Fallback>
+        <mc:Fallback xmlns="">
           <p:sp>
             <p:nvSpPr>
               <p:cNvPr id="2" name="TextBox 1">
@@ -34156,8 +34156,8 @@
           </a:p>
         </p:txBody>
       </p:sp>
-      <mc:AlternateContent xmlns:mc="http://schemas.openxmlformats.org/markup-compatibility/2006">
-        <mc:Choice xmlns:a14="http://schemas.microsoft.com/office/drawing/2010/main" Requires="a14">
+      <mc:AlternateContent xmlns:mc="http://schemas.openxmlformats.org/markup-compatibility/2006" xmlns:a14="http://schemas.microsoft.com/office/drawing/2010/main">
+        <mc:Choice Requires="a14">
           <p:sp>
             <p:nvSpPr>
               <p:cNvPr id="10" name="TextBox 9">
@@ -34252,7 +34252,7 @@
             </p:txBody>
           </p:sp>
         </mc:Choice>
-        <mc:Fallback>
+        <mc:Fallback xmlns="">
           <p:sp>
             <p:nvSpPr>
               <p:cNvPr id="10" name="TextBox 9">
@@ -34302,8 +34302,8 @@
           </p:sp>
         </mc:Fallback>
       </mc:AlternateContent>
-      <mc:AlternateContent xmlns:mc="http://schemas.openxmlformats.org/markup-compatibility/2006">
-        <mc:Choice xmlns:a14="http://schemas.microsoft.com/office/drawing/2010/main" Requires="a14">
+      <mc:AlternateContent xmlns:mc="http://schemas.openxmlformats.org/markup-compatibility/2006" xmlns:a14="http://schemas.microsoft.com/office/drawing/2010/main">
+        <mc:Choice Requires="a14">
           <p:sp>
             <p:nvSpPr>
               <p:cNvPr id="17" name="TextBox 16">
@@ -34564,7 +34564,7 @@
             </p:txBody>
           </p:sp>
         </mc:Choice>
-        <mc:Fallback>
+        <mc:Fallback xmlns="">
           <p:sp>
             <p:nvSpPr>
               <p:cNvPr id="17" name="TextBox 16">
@@ -34614,8 +34614,8 @@
           </p:sp>
         </mc:Fallback>
       </mc:AlternateContent>
-      <mc:AlternateContent xmlns:mc="http://schemas.openxmlformats.org/markup-compatibility/2006">
-        <mc:Choice xmlns:a14="http://schemas.microsoft.com/office/drawing/2010/main" Requires="a14">
+      <mc:AlternateContent xmlns:mc="http://schemas.openxmlformats.org/markup-compatibility/2006" xmlns:a14="http://schemas.microsoft.com/office/drawing/2010/main">
+        <mc:Choice Requires="a14">
           <p:sp>
             <p:nvSpPr>
               <p:cNvPr id="18" name="TextBox 17">
@@ -34747,7 +34747,7 @@
             </p:txBody>
           </p:sp>
         </mc:Choice>
-        <mc:Fallback>
+        <mc:Fallback xmlns="">
           <p:sp>
             <p:nvSpPr>
               <p:cNvPr id="18" name="TextBox 17">
@@ -34797,8 +34797,8 @@
           </p:sp>
         </mc:Fallback>
       </mc:AlternateContent>
-      <mc:AlternateContent xmlns:mc="http://schemas.openxmlformats.org/markup-compatibility/2006">
-        <mc:Choice xmlns:a14="http://schemas.microsoft.com/office/drawing/2010/main" Requires="a14">
+      <mc:AlternateContent xmlns:mc="http://schemas.openxmlformats.org/markup-compatibility/2006" xmlns:a14="http://schemas.microsoft.com/office/drawing/2010/main">
+        <mc:Choice Requires="a14">
           <p:sp>
             <p:nvSpPr>
               <p:cNvPr id="19" name="TextBox 18">
@@ -34904,7 +34904,7 @@
             </p:txBody>
           </p:sp>
         </mc:Choice>
-        <mc:Fallback>
+        <mc:Fallback xmlns="">
           <p:sp>
             <p:nvSpPr>
               <p:cNvPr id="19" name="TextBox 18">
@@ -34950,8 +34950,8 @@
           </p:sp>
         </mc:Fallback>
       </mc:AlternateContent>
-      <mc:AlternateContent xmlns:mc="http://schemas.openxmlformats.org/markup-compatibility/2006">
-        <mc:Choice xmlns:a14="http://schemas.microsoft.com/office/drawing/2010/main" Requires="a14">
+      <mc:AlternateContent xmlns:mc="http://schemas.openxmlformats.org/markup-compatibility/2006" xmlns:a14="http://schemas.microsoft.com/office/drawing/2010/main">
+        <mc:Choice Requires="a14">
           <p:sp>
             <p:nvSpPr>
               <p:cNvPr id="4" name="TextBox 3">
@@ -35078,7 +35078,7 @@
             </p:txBody>
           </p:sp>
         </mc:Choice>
-        <mc:Fallback>
+        <mc:Fallback xmlns="">
           <p:sp>
             <p:nvSpPr>
               <p:cNvPr id="4" name="TextBox 3">
@@ -35245,10 +35245,16 @@
                                 <m:t>𝑛</m:t>
                               </m:r>
                               <m:r>
+                                <a:rPr lang="en-GB" sz="2400" b="0" i="1" dirty="0" smtClean="0">
+                                  <a:latin typeface="Cambria Math" panose="02040503050406030204" pitchFamily="18" charset="0"/>
+                                </a:rPr>
+                                <m:t>+</m:t>
+                              </m:r>
+                              <m:r>
                                 <a:rPr lang="en-GB" sz="2400" i="1" dirty="0">
                                   <a:latin typeface="Cambria Math" panose="02040503050406030204" pitchFamily="18" charset="0"/>
                                 </a:rPr>
-                                <m:t>−1</m:t>
+                                <m:t>1</m:t>
                               </m:r>
                             </m:e>
                           </m:d>
@@ -35367,8 +35373,8 @@
           </a:p>
         </p:txBody>
       </p:sp>
-      <mc:AlternateContent xmlns:mc="http://schemas.openxmlformats.org/markup-compatibility/2006">
-        <mc:Choice xmlns:a14="http://schemas.microsoft.com/office/drawing/2010/main" Requires="a14">
+      <mc:AlternateContent xmlns:mc="http://schemas.openxmlformats.org/markup-compatibility/2006" xmlns:a14="http://schemas.microsoft.com/office/drawing/2010/main">
+        <mc:Choice Requires="a14">
           <p:sp>
             <p:nvSpPr>
               <p:cNvPr id="7" name="TextBox 6">
@@ -35541,7 +35547,7 @@
             </p:txBody>
           </p:sp>
         </mc:Choice>
-        <mc:Fallback>
+        <mc:Fallback xmlns="">
           <p:sp>
             <p:nvSpPr>
               <p:cNvPr id="7" name="TextBox 6">
@@ -36000,7 +36006,7 @@
       <p:bldP spid="19" grpId="0" animBg="1"/>
       <p:bldP spid="4" grpId="0" animBg="1"/>
       <p:bldP spid="5" grpId="0" animBg="1"/>
-      <p:bldP spid="7" grpId="0"/>
+      <p:bldP spid="7" grpId="0" animBg="1"/>
     </p:bldLst>
   </p:timing>
 </p:sld>
@@ -44012,18 +44018,18 @@
 </file>
 
 <file path=customXml/item1.xml><?xml version="1.0" encoding="utf-8"?>
+<p:properties xmlns:p="http://schemas.microsoft.com/office/2006/metadata/properties" xmlns:xsi="http://www.w3.org/2001/XMLSchema-instance" xmlns:pc="http://schemas.microsoft.com/office/infopath/2007/PartnerControls">
+  <documentManagement/>
+</p:properties>
+</file>
+
+<file path=customXml/item2.xml><?xml version="1.0" encoding="utf-8"?>
 <?mso-contentType ?>
 <FormTemplates xmlns="http://schemas.microsoft.com/sharepoint/v3/contenttype/forms">
   <Display>DocumentLibraryForm</Display>
   <Edit>DocumentLibraryForm</Edit>
   <New>DocumentLibraryForm</New>
 </FormTemplates>
-</file>
-
-<file path=customXml/item2.xml><?xml version="1.0" encoding="utf-8"?>
-<p:properties xmlns:p="http://schemas.microsoft.com/office/2006/metadata/properties" xmlns:xsi="http://www.w3.org/2001/XMLSchema-instance" xmlns:pc="http://schemas.microsoft.com/office/infopath/2007/PartnerControls">
-  <documentManagement/>
-</p:properties>
 </file>
 
 <file path=customXml/item3.xml><?xml version="1.0" encoding="utf-8"?>
@@ -44159,18 +44165,18 @@
 </file>
 
 <file path=customXml/itemProps1.xml><?xml version="1.0" encoding="utf-8"?>
-<ds:datastoreItem xmlns:ds="http://schemas.openxmlformats.org/officeDocument/2006/customXml" ds:itemID="{AE0C03B0-3DE5-4BD9-B3BB-6E4919CD06B4}">
+<ds:datastoreItem xmlns:ds="http://schemas.openxmlformats.org/officeDocument/2006/customXml" ds:itemID="{A05518A6-09E4-4E11-AE7D-4C13722BEBC7}">
   <ds:schemaRefs>
-    <ds:schemaRef ds:uri="http://schemas.microsoft.com/sharepoint/v3/contenttype/forms"/>
+    <ds:schemaRef ds:uri="http://schemas.microsoft.com/office/2006/metadata/properties"/>
+    <ds:schemaRef ds:uri="http://schemas.microsoft.com/office/infopath/2007/PartnerControls"/>
   </ds:schemaRefs>
 </ds:datastoreItem>
 </file>
 
 <file path=customXml/itemProps2.xml><?xml version="1.0" encoding="utf-8"?>
-<ds:datastoreItem xmlns:ds="http://schemas.openxmlformats.org/officeDocument/2006/customXml" ds:itemID="{A05518A6-09E4-4E11-AE7D-4C13722BEBC7}">
+<ds:datastoreItem xmlns:ds="http://schemas.openxmlformats.org/officeDocument/2006/customXml" ds:itemID="{AE0C03B0-3DE5-4BD9-B3BB-6E4919CD06B4}">
   <ds:schemaRefs>
-    <ds:schemaRef ds:uri="http://schemas.microsoft.com/office/2006/metadata/properties"/>
-    <ds:schemaRef ds:uri="http://schemas.microsoft.com/office/infopath/2007/PartnerControls"/>
+    <ds:schemaRef ds:uri="http://schemas.microsoft.com/sharepoint/v3/contenttype/forms"/>
   </ds:schemaRefs>
 </ds:datastoreItem>
 </file>

</xml_diff>